<commit_message>
Commit of what was eventually presented.
</commit_message>
<xml_diff>
--- a/firstPart/Neural Networks - pt 1.pptx
+++ b/firstPart/Neural Networks - pt 1.pptx
@@ -5,24 +5,27 @@
     <p:sldMasterId id="2147483648" r:id="rId4"/>
   </p:sldMasterIdLst>
   <p:notesMasterIdLst>
-    <p:notesMasterId r:id="rId20"/>
+    <p:notesMasterId r:id="rId23"/>
   </p:notesMasterIdLst>
   <p:sldIdLst>
     <p:sldId id="256" r:id="rId5"/>
     <p:sldId id="346" r:id="rId6"/>
     <p:sldId id="347" r:id="rId7"/>
-    <p:sldId id="348" r:id="rId8"/>
-    <p:sldId id="349" r:id="rId9"/>
-    <p:sldId id="332" r:id="rId10"/>
-    <p:sldId id="333" r:id="rId11"/>
-    <p:sldId id="334" r:id="rId12"/>
-    <p:sldId id="337" r:id="rId13"/>
-    <p:sldId id="336" r:id="rId14"/>
-    <p:sldId id="340" r:id="rId15"/>
-    <p:sldId id="350" r:id="rId16"/>
-    <p:sldId id="351" r:id="rId17"/>
-    <p:sldId id="352" r:id="rId18"/>
-    <p:sldId id="353" r:id="rId19"/>
+    <p:sldId id="356" r:id="rId8"/>
+    <p:sldId id="348" r:id="rId9"/>
+    <p:sldId id="349" r:id="rId10"/>
+    <p:sldId id="332" r:id="rId11"/>
+    <p:sldId id="333" r:id="rId12"/>
+    <p:sldId id="334" r:id="rId13"/>
+    <p:sldId id="337" r:id="rId14"/>
+    <p:sldId id="336" r:id="rId15"/>
+    <p:sldId id="340" r:id="rId16"/>
+    <p:sldId id="350" r:id="rId17"/>
+    <p:sldId id="354" r:id="rId18"/>
+    <p:sldId id="351" r:id="rId19"/>
+    <p:sldId id="357" r:id="rId20"/>
+    <p:sldId id="353" r:id="rId21"/>
+    <p:sldId id="355" r:id="rId22"/>
   </p:sldIdLst>
   <p:sldSz cx="12192000" cy="6858000"/>
   <p:notesSz cx="6858000" cy="9144000"/>
@@ -211,7 +214,7 @@
           <a:p>
             <a:fld id="{23C00255-F9D1-4A85-9CA7-3264ABB3D6FD}" type="datetimeFigureOut">
               <a:rPr lang="en-US" smtClean="0"/>
-              <a:t>9/14/2021</a:t>
+              <a:t>9/22/2021</a:t>
             </a:fld>
             <a:endParaRPr lang="en-US"/>
           </a:p>
@@ -478,6 +481,180 @@
 </p:notesMaster>
 </file>
 
+<file path=ppt/notesSlides/notesSlide1.xml><?xml version="1.0" encoding="utf-8"?>
+<p:notes xmlns:a="http://schemas.openxmlformats.org/drawingml/2006/main" xmlns:r="http://schemas.openxmlformats.org/officeDocument/2006/relationships" xmlns:p="http://schemas.openxmlformats.org/presentationml/2006/main">
+  <p:cSld>
+    <p:spTree>
+      <p:nvGrpSpPr>
+        <p:cNvPr id="1" name=""/>
+        <p:cNvGrpSpPr/>
+        <p:nvPr/>
+      </p:nvGrpSpPr>
+      <p:grpSpPr>
+        <a:xfrm>
+          <a:off x="0" y="0"/>
+          <a:ext cx="0" cy="0"/>
+          <a:chOff x="0" y="0"/>
+          <a:chExt cx="0" cy="0"/>
+        </a:xfrm>
+      </p:grpSpPr>
+      <p:sp>
+        <p:nvSpPr>
+          <p:cNvPr id="2" name="Slide Image Placeholder 1"/>
+          <p:cNvSpPr>
+            <a:spLocks noGrp="1" noRot="1" noChangeAspect="1"/>
+          </p:cNvSpPr>
+          <p:nvPr>
+            <p:ph type="sldImg"/>
+          </p:nvPr>
+        </p:nvSpPr>
+        <p:spPr/>
+      </p:sp>
+      <p:sp>
+        <p:nvSpPr>
+          <p:cNvPr id="3" name="Notes Placeholder 2"/>
+          <p:cNvSpPr>
+            <a:spLocks noGrp="1"/>
+          </p:cNvSpPr>
+          <p:nvPr>
+            <p:ph type="body" idx="1"/>
+          </p:nvPr>
+        </p:nvSpPr>
+        <p:spPr/>
+        <p:txBody>
+          <a:bodyPr/>
+          <a:lstStyle/>
+          <a:p>
+            <a:r>
+              <a:rPr lang="en-US" dirty="0"/>
+              <a:t>A transformation</a:t>
+            </a:r>
+          </a:p>
+        </p:txBody>
+      </p:sp>
+      <p:sp>
+        <p:nvSpPr>
+          <p:cNvPr id="4" name="Slide Number Placeholder 3"/>
+          <p:cNvSpPr>
+            <a:spLocks noGrp="1"/>
+          </p:cNvSpPr>
+          <p:nvPr>
+            <p:ph type="sldNum" sz="quarter" idx="5"/>
+          </p:nvPr>
+        </p:nvSpPr>
+        <p:spPr/>
+        <p:txBody>
+          <a:bodyPr/>
+          <a:lstStyle/>
+          <a:p>
+            <a:fld id="{D787DC57-3374-4791-ABC5-1ABF780636B3}" type="slidenum">
+              <a:rPr lang="en-US" smtClean="0"/>
+              <a:t>3</a:t>
+            </a:fld>
+            <a:endParaRPr lang="en-US"/>
+          </a:p>
+        </p:txBody>
+      </p:sp>
+    </p:spTree>
+    <p:extLst>
+      <p:ext uri="{BB962C8B-B14F-4D97-AF65-F5344CB8AC3E}">
+        <p14:creationId xmlns:p14="http://schemas.microsoft.com/office/powerpoint/2010/main" val="1489760730"/>
+      </p:ext>
+    </p:extLst>
+  </p:cSld>
+  <p:clrMapOvr>
+    <a:masterClrMapping/>
+  </p:clrMapOvr>
+</p:notes>
+</file>
+
+<file path=ppt/notesSlides/notesSlide2.xml><?xml version="1.0" encoding="utf-8"?>
+<p:notes xmlns:a="http://schemas.openxmlformats.org/drawingml/2006/main" xmlns:r="http://schemas.openxmlformats.org/officeDocument/2006/relationships" xmlns:p="http://schemas.openxmlformats.org/presentationml/2006/main">
+  <p:cSld>
+    <p:spTree>
+      <p:nvGrpSpPr>
+        <p:cNvPr id="1" name=""/>
+        <p:cNvGrpSpPr/>
+        <p:nvPr/>
+      </p:nvGrpSpPr>
+      <p:grpSpPr>
+        <a:xfrm>
+          <a:off x="0" y="0"/>
+          <a:ext cx="0" cy="0"/>
+          <a:chOff x="0" y="0"/>
+          <a:chExt cx="0" cy="0"/>
+        </a:xfrm>
+      </p:grpSpPr>
+      <p:sp>
+        <p:nvSpPr>
+          <p:cNvPr id="2" name="Slide Image Placeholder 1"/>
+          <p:cNvSpPr>
+            <a:spLocks noGrp="1" noRot="1" noChangeAspect="1"/>
+          </p:cNvSpPr>
+          <p:nvPr>
+            <p:ph type="sldImg"/>
+          </p:nvPr>
+        </p:nvSpPr>
+        <p:spPr/>
+      </p:sp>
+      <p:sp>
+        <p:nvSpPr>
+          <p:cNvPr id="3" name="Notes Placeholder 2"/>
+          <p:cNvSpPr>
+            <a:spLocks noGrp="1"/>
+          </p:cNvSpPr>
+          <p:nvPr>
+            <p:ph type="body" idx="1"/>
+          </p:nvPr>
+        </p:nvSpPr>
+        <p:spPr/>
+        <p:txBody>
+          <a:bodyPr/>
+          <a:lstStyle/>
+          <a:p>
+            <a:r>
+              <a:rPr lang="en-US" dirty="0"/>
+              <a:t>Final</a:t>
+            </a:r>
+          </a:p>
+        </p:txBody>
+      </p:sp>
+      <p:sp>
+        <p:nvSpPr>
+          <p:cNvPr id="4" name="Slide Number Placeholder 3"/>
+          <p:cNvSpPr>
+            <a:spLocks noGrp="1"/>
+          </p:cNvSpPr>
+          <p:nvPr>
+            <p:ph type="sldNum" sz="quarter" idx="5"/>
+          </p:nvPr>
+        </p:nvSpPr>
+        <p:spPr/>
+        <p:txBody>
+          <a:bodyPr/>
+          <a:lstStyle/>
+          <a:p>
+            <a:fld id="{D787DC57-3374-4791-ABC5-1ABF780636B3}" type="slidenum">
+              <a:rPr lang="en-US" smtClean="0"/>
+              <a:t>14</a:t>
+            </a:fld>
+            <a:endParaRPr lang="en-US"/>
+          </a:p>
+        </p:txBody>
+      </p:sp>
+    </p:spTree>
+    <p:extLst>
+      <p:ext uri="{BB962C8B-B14F-4D97-AF65-F5344CB8AC3E}">
+        <p14:creationId xmlns:p14="http://schemas.microsoft.com/office/powerpoint/2010/main" val="586778992"/>
+      </p:ext>
+    </p:extLst>
+  </p:cSld>
+  <p:clrMapOvr>
+    <a:masterClrMapping/>
+  </p:clrMapOvr>
+</p:notes>
+</file>
+
 <file path=ppt/slideLayouts/slideLayout1.xml><?xml version="1.0" encoding="utf-8"?>
 <p:sldLayout xmlns:a="http://schemas.openxmlformats.org/drawingml/2006/main" xmlns:r="http://schemas.openxmlformats.org/officeDocument/2006/relationships" xmlns:p="http://schemas.openxmlformats.org/presentationml/2006/main" type="title" preserve="1">
   <p:cSld name="Title Slide">
@@ -625,7 +802,7 @@
           <a:p>
             <a:fld id="{E6A79CE6-6A3C-45BC-B8DD-73F063198CA6}" type="datetimeFigureOut">
               <a:rPr lang="en-US" smtClean="0"/>
-              <a:t>9/14/2021</a:t>
+              <a:t>9/22/2021</a:t>
             </a:fld>
             <a:endParaRPr lang="en-US"/>
           </a:p>
@@ -823,7 +1000,7 @@
           <a:p>
             <a:fld id="{E6A79CE6-6A3C-45BC-B8DD-73F063198CA6}" type="datetimeFigureOut">
               <a:rPr lang="en-US" smtClean="0"/>
-              <a:t>9/14/2021</a:t>
+              <a:t>9/22/2021</a:t>
             </a:fld>
             <a:endParaRPr lang="en-US"/>
           </a:p>
@@ -1031,7 +1208,7 @@
           <a:p>
             <a:fld id="{E6A79CE6-6A3C-45BC-B8DD-73F063198CA6}" type="datetimeFigureOut">
               <a:rPr lang="en-US" smtClean="0"/>
-              <a:t>9/14/2021</a:t>
+              <a:t>9/22/2021</a:t>
             </a:fld>
             <a:endParaRPr lang="en-US"/>
           </a:p>
@@ -1229,7 +1406,7 @@
           <a:p>
             <a:fld id="{E6A79CE6-6A3C-45BC-B8DD-73F063198CA6}" type="datetimeFigureOut">
               <a:rPr lang="en-US" smtClean="0"/>
-              <a:t>9/14/2021</a:t>
+              <a:t>9/22/2021</a:t>
             </a:fld>
             <a:endParaRPr lang="en-US"/>
           </a:p>
@@ -1504,7 +1681,7 @@
           <a:p>
             <a:fld id="{E6A79CE6-6A3C-45BC-B8DD-73F063198CA6}" type="datetimeFigureOut">
               <a:rPr lang="en-US" smtClean="0"/>
-              <a:t>9/14/2021</a:t>
+              <a:t>9/22/2021</a:t>
             </a:fld>
             <a:endParaRPr lang="en-US"/>
           </a:p>
@@ -1769,7 +1946,7 @@
           <a:p>
             <a:fld id="{E6A79CE6-6A3C-45BC-B8DD-73F063198CA6}" type="datetimeFigureOut">
               <a:rPr lang="en-US" smtClean="0"/>
-              <a:t>9/14/2021</a:t>
+              <a:t>9/22/2021</a:t>
             </a:fld>
             <a:endParaRPr lang="en-US"/>
           </a:p>
@@ -2181,7 +2358,7 @@
           <a:p>
             <a:fld id="{E6A79CE6-6A3C-45BC-B8DD-73F063198CA6}" type="datetimeFigureOut">
               <a:rPr lang="en-US" smtClean="0"/>
-              <a:t>9/14/2021</a:t>
+              <a:t>9/22/2021</a:t>
             </a:fld>
             <a:endParaRPr lang="en-US"/>
           </a:p>
@@ -2322,7 +2499,7 @@
           <a:p>
             <a:fld id="{E6A79CE6-6A3C-45BC-B8DD-73F063198CA6}" type="datetimeFigureOut">
               <a:rPr lang="en-US" smtClean="0"/>
-              <a:t>9/14/2021</a:t>
+              <a:t>9/22/2021</a:t>
             </a:fld>
             <a:endParaRPr lang="en-US"/>
           </a:p>
@@ -2435,7 +2612,7 @@
           <a:p>
             <a:fld id="{E6A79CE6-6A3C-45BC-B8DD-73F063198CA6}" type="datetimeFigureOut">
               <a:rPr lang="en-US" smtClean="0"/>
-              <a:t>9/14/2021</a:t>
+              <a:t>9/22/2021</a:t>
             </a:fld>
             <a:endParaRPr lang="en-US"/>
           </a:p>
@@ -2746,7 +2923,7 @@
           <a:p>
             <a:fld id="{E6A79CE6-6A3C-45BC-B8DD-73F063198CA6}" type="datetimeFigureOut">
               <a:rPr lang="en-US" smtClean="0"/>
-              <a:t>9/14/2021</a:t>
+              <a:t>9/22/2021</a:t>
             </a:fld>
             <a:endParaRPr lang="en-US"/>
           </a:p>
@@ -3034,7 +3211,7 @@
           <a:p>
             <a:fld id="{E6A79CE6-6A3C-45BC-B8DD-73F063198CA6}" type="datetimeFigureOut">
               <a:rPr lang="en-US" smtClean="0"/>
-              <a:t>9/14/2021</a:t>
+              <a:t>9/22/2021</a:t>
             </a:fld>
             <a:endParaRPr lang="en-US"/>
           </a:p>
@@ -3275,7 +3452,7 @@
           <a:p>
             <a:fld id="{E6A79CE6-6A3C-45BC-B8DD-73F063198CA6}" type="datetimeFigureOut">
               <a:rPr lang="en-US" smtClean="0"/>
-              <a:t>9/14/2021</a:t>
+              <a:t>9/22/2021</a:t>
             </a:fld>
             <a:endParaRPr lang="en-US"/>
           </a:p>
@@ -3743,7 +3920,13 @@
           <a:p>
             <a:r>
               <a:rPr lang="en-US" dirty="0"/>
-              <a:t>Why so powerful?</a:t>
+              <a:t>(the fully connected kind)</a:t>
+            </a:r>
+          </a:p>
+          <a:p>
+            <a:r>
+              <a:rPr lang="en-US" dirty="0"/>
+              <a:t>Why the big deal?</a:t>
             </a:r>
           </a:p>
         </p:txBody>
@@ -3801,7 +3984,7 @@
           <a:p>
             <a:r>
               <a:rPr lang="en-US" dirty="0"/>
-              <a:t>Anatomy of a fully connected neural network</a:t>
+              <a:t>Hidden Layer Anatomy, continued</a:t>
             </a:r>
           </a:p>
         </p:txBody>
@@ -3856,7 +4039,7 @@
         <p:spPr>
           <a:xfrm>
             <a:off x="5145741" y="1709737"/>
-            <a:ext cx="6208059" cy="2677656"/>
+            <a:ext cx="6208059" cy="1938992"/>
           </a:xfrm>
           <a:prstGeom prst="rect">
             <a:avLst/>
@@ -3871,7 +4054,7 @@
           <a:p>
             <a:r>
               <a:rPr lang="en-US" sz="2400" dirty="0"/>
-              <a:t>The number of nodes in the output layer is determined by the number of outputs.  This one has two.</a:t>
+              <a:t>The most common activation function is the rectified linear unit (RELU):</a:t>
             </a:r>
           </a:p>
           <a:p>
@@ -3880,15 +4063,57 @@
           <a:p>
             <a:r>
               <a:rPr lang="en-US" sz="2400" dirty="0"/>
-              <a:t>The output activations are manipulated into predictions, and are compared to the actual output, i.e. Y’s</a:t>
-            </a:r>
-          </a:p>
-        </p:txBody>
-      </p:sp>
+              <a:t>RELU(x) = </a:t>
+            </a:r>
+          </a:p>
+          <a:p>
+            <a:r>
+              <a:rPr lang="en-US" sz="2400" dirty="0"/>
+              <a:t>Max(0,x)</a:t>
+            </a:r>
+          </a:p>
+        </p:txBody>
+      </p:sp>
+      <p:pic>
+        <p:nvPicPr>
+          <p:cNvPr id="7" name="Picture 6">
+            <a:extLst>
+              <a:ext uri="{FF2B5EF4-FFF2-40B4-BE49-F238E27FC236}">
+                <a16:creationId xmlns:a16="http://schemas.microsoft.com/office/drawing/2014/main" id="{717E11FC-1CF9-440E-8244-CF6BA8FE35D6}"/>
+              </a:ext>
+            </a:extLst>
+          </p:cNvPr>
+          <p:cNvPicPr>
+            <a:picLocks noChangeAspect="1"/>
+          </p:cNvPicPr>
+          <p:nvPr/>
+        </p:nvPicPr>
+        <p:blipFill>
+          <a:blip r:embed="rId3">
+            <a:extLst>
+              <a:ext uri="{28A0092B-C50C-407E-A947-70E740481C1C}">
+                <a14:useLocalDpi xmlns:a14="http://schemas.microsoft.com/office/drawing/2010/main" val="0"/>
+              </a:ext>
+            </a:extLst>
+          </a:blip>
+          <a:stretch>
+            <a:fillRect/>
+          </a:stretch>
+        </p:blipFill>
+        <p:spPr>
+          <a:xfrm>
+            <a:off x="7853084" y="2454217"/>
+            <a:ext cx="4212531" cy="4212531"/>
+          </a:xfrm>
+          <a:prstGeom prst="rect">
+            <a:avLst/>
+          </a:prstGeom>
+        </p:spPr>
+      </p:pic>
     </p:spTree>
     <p:extLst>
       <p:ext uri="{BB962C8B-B14F-4D97-AF65-F5344CB8AC3E}">
-        <p14:creationId xmlns:p14="http://schemas.microsoft.com/office/powerpoint/2010/main" val="2449914674"/>
+        <p14:creationId xmlns:p14="http://schemas.microsoft.com/office/powerpoint/2010/main" val="2164135771"/>
       </p:ext>
     </p:extLst>
   </p:cSld>
@@ -3938,17 +4163,52 @@
           <a:p>
             <a:r>
               <a:rPr lang="en-US" dirty="0"/>
-              <a:t>Why on earth would we ever use neural networks?</a:t>
-            </a:r>
-          </a:p>
-        </p:txBody>
-      </p:sp>
-      <p:sp>
-        <p:nvSpPr>
-          <p:cNvPr id="7" name="TextBox 6">
-            <a:extLst>
-              <a:ext uri="{FF2B5EF4-FFF2-40B4-BE49-F238E27FC236}">
-                <a16:creationId xmlns:a16="http://schemas.microsoft.com/office/drawing/2014/main" id="{A839B4CB-4C50-4536-8B06-0280D21BCF7C}"/>
+              <a:t>Output Layer</a:t>
+            </a:r>
+          </a:p>
+        </p:txBody>
+      </p:sp>
+      <p:pic>
+        <p:nvPicPr>
+          <p:cNvPr id="5" name="Content Placeholder 4">
+            <a:extLst>
+              <a:ext uri="{FF2B5EF4-FFF2-40B4-BE49-F238E27FC236}">
+                <a16:creationId xmlns:a16="http://schemas.microsoft.com/office/drawing/2014/main" id="{104C6E1E-EB4C-44EB-9228-565C02B70BB3}"/>
+              </a:ext>
+            </a:extLst>
+          </p:cNvPr>
+          <p:cNvPicPr>
+            <a:picLocks noGrp="1" noChangeAspect="1"/>
+          </p:cNvPicPr>
+          <p:nvPr>
+            <p:ph idx="1"/>
+          </p:nvPr>
+        </p:nvPicPr>
+        <p:blipFill>
+          <a:blip r:embed="rId2">
+            <a:extLst>
+              <a:ext uri="{28A0092B-C50C-407E-A947-70E740481C1C}">
+                <a14:useLocalDpi xmlns:a14="http://schemas.microsoft.com/office/drawing/2010/main" val="0"/>
+              </a:ext>
+            </a:extLst>
+          </a:blip>
+          <a:stretch>
+            <a:fillRect/>
+          </a:stretch>
+        </p:blipFill>
+        <p:spPr>
+          <a:xfrm>
+            <a:off x="838200" y="1709737"/>
+            <a:ext cx="3500718" cy="4212531"/>
+          </a:xfrm>
+        </p:spPr>
+      </p:pic>
+      <p:sp>
+        <p:nvSpPr>
+          <p:cNvPr id="6" name="TextBox 5">
+            <a:extLst>
+              <a:ext uri="{FF2B5EF4-FFF2-40B4-BE49-F238E27FC236}">
+                <a16:creationId xmlns:a16="http://schemas.microsoft.com/office/drawing/2014/main" id="{E2B47211-B897-4CEF-853A-E6E11C47FFDC}"/>
               </a:ext>
             </a:extLst>
           </p:cNvPr>
@@ -3957,8 +4217,8 @@
         </p:nvSpPr>
         <p:spPr>
           <a:xfrm>
-            <a:off x="1082488" y="1905017"/>
-            <a:ext cx="10027024" cy="3785652"/>
+            <a:off x="5145741" y="1709737"/>
+            <a:ext cx="6208059" cy="3416320"/>
           </a:xfrm>
           <a:prstGeom prst="rect">
             <a:avLst/>
@@ -3973,65 +4233,30 @@
           <a:p>
             <a:r>
               <a:rPr lang="en-US" sz="2400" dirty="0"/>
-              <a:t>Why, again, is it a big deal that neural networks can calculate BMI?</a:t>
+              <a:t>The number of nodes in the output layer is determined by the number of outputs.  This one has two.</a:t>
             </a:r>
           </a:p>
           <a:p>
             <a:endParaRPr lang="en-US" sz="2400" dirty="0"/>
           </a:p>
           <a:p>
-            <a:endParaRPr lang="en-US" sz="2400" dirty="0"/>
-          </a:p>
-          <a:p>
             <a:r>
               <a:rPr lang="en-US" sz="2400" dirty="0"/>
-              <a:t>Who here is familiar with the concept of </a:t>
-            </a:r>
-            <a:r>
-              <a:rPr lang="en-US" sz="2400" dirty="0">
-                <a:hlinkClick r:id="rId2"/>
-              </a:rPr>
-              <a:t>Peer Review</a:t>
-            </a:r>
+              <a:t>There is a final regression.  The outputs of these regressions are often manipulated into predictions, and are compared to the actual output, i.e. the Y’s.</a:t>
+            </a:r>
+          </a:p>
+          <a:p>
             <a:r>
               <a:rPr lang="en-US" sz="2400" dirty="0"/>
-              <a:t>?</a:t>
-            </a:r>
-          </a:p>
-          <a:p>
-            <a:endParaRPr lang="en-US" sz="2400" dirty="0"/>
-          </a:p>
-          <a:p>
-            <a:endParaRPr lang="en-US" sz="2400" dirty="0"/>
-          </a:p>
-          <a:p>
-            <a:endParaRPr lang="en-US" sz="2400" dirty="0"/>
-          </a:p>
-          <a:p>
-            <a:r>
-              <a:rPr lang="en-US" sz="2400" dirty="0"/>
-              <a:t>You need only search </a:t>
-            </a:r>
-            <a:r>
-              <a:rPr lang="en-US" sz="2400" dirty="0">
-                <a:hlinkClick r:id="rId3"/>
-              </a:rPr>
-              <a:t>PubMed</a:t>
-            </a:r>
-            <a:r>
-              <a:rPr lang="en-US" sz="2400" dirty="0"/>
-              <a:t> to see that BMI has been through that wringer.  There are still people arguing over the validity of BMI.</a:t>
-            </a:r>
-          </a:p>
-          <a:p>
-            <a:endParaRPr lang="en-US" sz="2400" dirty="0"/>
+              <a:t>(topic for a future presentation…)</a:t>
+            </a:r>
           </a:p>
         </p:txBody>
       </p:sp>
     </p:spTree>
     <p:extLst>
       <p:ext uri="{BB962C8B-B14F-4D97-AF65-F5344CB8AC3E}">
-        <p14:creationId xmlns:p14="http://schemas.microsoft.com/office/powerpoint/2010/main" val="2506490119"/>
+        <p14:creationId xmlns:p14="http://schemas.microsoft.com/office/powerpoint/2010/main" val="2449914674"/>
       </p:ext>
     </p:extLst>
   </p:cSld>
@@ -4063,7 +4288,7 @@
           <p:cNvPr id="2" name="Title 1">
             <a:extLst>
               <a:ext uri="{FF2B5EF4-FFF2-40B4-BE49-F238E27FC236}">
-                <a16:creationId xmlns:a16="http://schemas.microsoft.com/office/drawing/2014/main" id="{39EBEEBF-C05D-4B9E-B970-34F660BAFB1F}"/>
+                <a16:creationId xmlns:a16="http://schemas.microsoft.com/office/drawing/2014/main" id="{9FDAD1F5-FF3E-4A7E-8FD0-2301EFC72146}"/>
               </a:ext>
             </a:extLst>
           </p:cNvPr>
@@ -4081,94 +4306,117 @@
           <a:p>
             <a:r>
               <a:rPr lang="en-US" dirty="0"/>
-              <a:t>Why are we talking about Peer Review?</a:t>
-            </a:r>
-          </a:p>
-        </p:txBody>
-      </p:sp>
-      <p:sp>
-        <p:nvSpPr>
-          <p:cNvPr id="3" name="Content Placeholder 2">
-            <a:extLst>
-              <a:ext uri="{FF2B5EF4-FFF2-40B4-BE49-F238E27FC236}">
-                <a16:creationId xmlns:a16="http://schemas.microsoft.com/office/drawing/2014/main" id="{FC520B6A-1B44-4E5E-A95F-D83935E38175}"/>
-              </a:ext>
-            </a:extLst>
-          </p:cNvPr>
-          <p:cNvSpPr>
-            <a:spLocks noGrp="1"/>
-          </p:cNvSpPr>
-          <p:nvPr>
-            <p:ph idx="1"/>
-          </p:nvPr>
-        </p:nvSpPr>
-        <p:spPr/>
-        <p:txBody>
-          <a:bodyPr/>
-          <a:lstStyle/>
-          <a:p>
-            <a:pPr marL="0" indent="0">
-              <a:buNone/>
-            </a:pPr>
-            <a:r>
-              <a:rPr lang="en-US" dirty="0"/>
-              <a:t>Well, for those of you familiar, peer review can be a tedious, time-consuming endeavor.</a:t>
-            </a:r>
-          </a:p>
-          <a:p>
-            <a:pPr marL="0" indent="0">
-              <a:buNone/>
-            </a:pPr>
-            <a:endParaRPr lang="en-US" dirty="0"/>
-          </a:p>
-          <a:p>
-            <a:pPr marL="0" indent="0">
-              <a:buNone/>
-            </a:pPr>
-            <a:endParaRPr lang="en-US" dirty="0"/>
-          </a:p>
-          <a:p>
-            <a:pPr marL="0" indent="0">
-              <a:buNone/>
-            </a:pPr>
-            <a:r>
-              <a:rPr lang="en-US" dirty="0"/>
-              <a:t>Consider a slightly different example.</a:t>
-            </a:r>
-          </a:p>
-          <a:p>
-            <a:pPr marL="0" indent="0">
-              <a:buNone/>
-            </a:pPr>
-            <a:endParaRPr lang="en-US" dirty="0"/>
-          </a:p>
-          <a:p>
-            <a:pPr marL="0" indent="0">
-              <a:buNone/>
-            </a:pPr>
-            <a:endParaRPr lang="en-US" dirty="0"/>
-          </a:p>
-          <a:p>
-            <a:pPr marL="0" indent="0" algn="ctr">
-              <a:buNone/>
-            </a:pPr>
-            <a:r>
-              <a:rPr lang="en-US" i="1" dirty="0"/>
-              <a:t>[switch to code]</a:t>
-            </a:r>
-          </a:p>
-          <a:p>
-            <a:pPr marL="0" indent="0">
-              <a:buNone/>
-            </a:pPr>
-            <a:endParaRPr lang="en-US" dirty="0"/>
+              <a:t>Why on earth would we ever use neural networks?</a:t>
+            </a:r>
+          </a:p>
+        </p:txBody>
+      </p:sp>
+      <p:sp>
+        <p:nvSpPr>
+          <p:cNvPr id="7" name="TextBox 6">
+            <a:extLst>
+              <a:ext uri="{FF2B5EF4-FFF2-40B4-BE49-F238E27FC236}">
+                <a16:creationId xmlns:a16="http://schemas.microsoft.com/office/drawing/2014/main" id="{A839B4CB-4C50-4536-8B06-0280D21BCF7C}"/>
+              </a:ext>
+            </a:extLst>
+          </p:cNvPr>
+          <p:cNvSpPr txBox="1"/>
+          <p:nvPr/>
+        </p:nvSpPr>
+        <p:spPr>
+          <a:xfrm>
+            <a:off x="1082488" y="1905017"/>
+            <a:ext cx="10027024" cy="4154984"/>
+          </a:xfrm>
+          <a:prstGeom prst="rect">
+            <a:avLst/>
+          </a:prstGeom>
+          <a:noFill/>
+        </p:spPr>
+        <p:txBody>
+          <a:bodyPr wrap="square" rtlCol="0">
+            <a:spAutoFit/>
+          </a:bodyPr>
+          <a:lstStyle/>
+          <a:p>
+            <a:r>
+              <a:rPr lang="en-US" sz="2400" dirty="0"/>
+              <a:t>Why, again, is it a big deal that neural networks can calculate BMI?</a:t>
+            </a:r>
+          </a:p>
+          <a:p>
+            <a:r>
+              <a:rPr lang="en-US" sz="2400" dirty="0"/>
+              <a:t>“We’re capable of calculating it ourselves.”</a:t>
+            </a:r>
+          </a:p>
+          <a:p>
+            <a:endParaRPr lang="en-US" sz="2400" dirty="0"/>
+          </a:p>
+          <a:p>
+            <a:endParaRPr lang="en-US" sz="2400" dirty="0"/>
+          </a:p>
+          <a:p>
+            <a:r>
+              <a:rPr lang="en-US" sz="2400" dirty="0"/>
+              <a:t>Who here is familiar with the concept of </a:t>
+            </a:r>
+            <a:r>
+              <a:rPr lang="en-US" sz="2400" dirty="0">
+                <a:hlinkClick r:id="rId2"/>
+              </a:rPr>
+              <a:t>Peer Review</a:t>
+            </a:r>
+            <a:r>
+              <a:rPr lang="en-US" sz="2400" dirty="0"/>
+              <a:t>?</a:t>
+            </a:r>
+          </a:p>
+          <a:p>
+            <a:endParaRPr lang="en-US" sz="2400" dirty="0"/>
+          </a:p>
+          <a:p>
+            <a:endParaRPr lang="en-US" sz="2400" dirty="0"/>
+          </a:p>
+          <a:p>
+            <a:r>
+              <a:rPr lang="en-US" sz="2400" dirty="0"/>
+              <a:t>BMI was originally proposed in the early 19</a:t>
+            </a:r>
+            <a:r>
+              <a:rPr lang="en-US" sz="2400" baseline="30000" dirty="0"/>
+              <a:t>th</a:t>
+            </a:r>
+            <a:r>
+              <a:rPr lang="en-US" sz="2400" dirty="0"/>
+              <a:t> century.</a:t>
+            </a:r>
+          </a:p>
+          <a:p>
+            <a:r>
+              <a:rPr lang="en-US" sz="2400" dirty="0"/>
+              <a:t>You need only search </a:t>
+            </a:r>
+            <a:r>
+              <a:rPr lang="en-US" sz="2400" dirty="0">
+                <a:hlinkClick r:id="rId3"/>
+              </a:rPr>
+              <a:t>PubMed</a:t>
+            </a:r>
+            <a:r>
+              <a:rPr lang="en-US" sz="2400" dirty="0"/>
+              <a:t> to see that BMI has been through that wringer, and there are still people arguing over the validity of BMI.</a:t>
+            </a:r>
+          </a:p>
+          <a:p>
+            <a:endParaRPr lang="en-US" sz="2400" dirty="0"/>
           </a:p>
         </p:txBody>
       </p:sp>
     </p:spTree>
     <p:extLst>
       <p:ext uri="{BB962C8B-B14F-4D97-AF65-F5344CB8AC3E}">
-        <p14:creationId xmlns:p14="http://schemas.microsoft.com/office/powerpoint/2010/main" val="2356770955"/>
+        <p14:creationId xmlns:p14="http://schemas.microsoft.com/office/powerpoint/2010/main" val="2506490119"/>
       </p:ext>
     </p:extLst>
   </p:cSld>
@@ -4200,7 +4448,7 @@
           <p:cNvPr id="2" name="Title 1">
             <a:extLst>
               <a:ext uri="{FF2B5EF4-FFF2-40B4-BE49-F238E27FC236}">
-                <a16:creationId xmlns:a16="http://schemas.microsoft.com/office/drawing/2014/main" id="{E947B2E4-5BB5-4B15-85ED-BE2D33C53592}"/>
+                <a16:creationId xmlns:a16="http://schemas.microsoft.com/office/drawing/2014/main" id="{39EBEEBF-C05D-4B9E-B970-34F660BAFB1F}"/>
               </a:ext>
             </a:extLst>
           </p:cNvPr>
@@ -4228,7 +4476,7 @@
           <p:cNvPr id="3" name="Content Placeholder 2">
             <a:extLst>
               <a:ext uri="{FF2B5EF4-FFF2-40B4-BE49-F238E27FC236}">
-                <a16:creationId xmlns:a16="http://schemas.microsoft.com/office/drawing/2014/main" id="{5163704A-5F0C-4BE8-8A13-7DB597909E9A}"/>
+                <a16:creationId xmlns:a16="http://schemas.microsoft.com/office/drawing/2014/main" id="{FC520B6A-1B44-4E5E-A95F-D83935E38175}"/>
               </a:ext>
             </a:extLst>
           </p:cNvPr>
@@ -4249,7 +4497,7 @@
             </a:pPr>
             <a:r>
               <a:rPr lang="en-US" dirty="0"/>
-              <a:t>Our previous neural network had an input layer of 6, and two sequential hidden layers of size 16.  This was sufficient to predict BMI.</a:t>
+              <a:t>Well, for those of you familiar, peer review can be a tedious, time-consuming endeavor.</a:t>
             </a:r>
           </a:p>
           <a:p>
@@ -4262,24 +4510,32 @@
             <a:pPr marL="0" indent="0">
               <a:buNone/>
             </a:pPr>
+            <a:endParaRPr lang="en-US" dirty="0"/>
+          </a:p>
+          <a:p>
+            <a:pPr marL="0" indent="0">
+              <a:buNone/>
+            </a:pPr>
             <a:r>
               <a:rPr lang="en-US" dirty="0"/>
-              <a:t>Suppose instead, we added on another hidden layer, and tried to predict the likelihood of a patient developing type 2 diabetes—we know our NN is capable of simulating BMI by that point.</a:t>
+              <a:t>Suppose you were to propose an novel/alternative </a:t>
+            </a:r>
+            <a:r>
+              <a:rPr lang="en-US" i="1" dirty="0"/>
+              <a:t>transformation</a:t>
+            </a:r>
+            <a:r>
+              <a:rPr lang="en-US" dirty="0"/>
+              <a:t> to create a proxy for obesity.</a:t>
             </a:r>
           </a:p>
           <a:p>
             <a:pPr marL="0" indent="0">
               <a:buNone/>
             </a:pPr>
-            <a:endParaRPr lang="en-US" dirty="0"/>
-          </a:p>
-          <a:p>
-            <a:pPr marL="0" indent="0">
-              <a:buNone/>
-            </a:pPr>
             <a:r>
               <a:rPr lang="en-US" dirty="0"/>
-              <a:t>This is why Neural Nets are a big deal.</a:t>
+              <a:t>You would have to go through the peer review process all over again.</a:t>
             </a:r>
           </a:p>
         </p:txBody>
@@ -4287,7 +4543,7 @@
     </p:spTree>
     <p:extLst>
       <p:ext uri="{BB962C8B-B14F-4D97-AF65-F5344CB8AC3E}">
-        <p14:creationId xmlns:p14="http://schemas.microsoft.com/office/powerpoint/2010/main" val="834176526"/>
+        <p14:creationId xmlns:p14="http://schemas.microsoft.com/office/powerpoint/2010/main" val="2356770955"/>
       </p:ext>
     </p:extLst>
   </p:cSld>
@@ -4319,7 +4575,7 @@
           <p:cNvPr id="2" name="Title 1">
             <a:extLst>
               <a:ext uri="{FF2B5EF4-FFF2-40B4-BE49-F238E27FC236}">
-                <a16:creationId xmlns:a16="http://schemas.microsoft.com/office/drawing/2014/main" id="{471E36F7-63F1-42B7-A92B-B2B3376E442F}"/>
+                <a16:creationId xmlns:a16="http://schemas.microsoft.com/office/drawing/2014/main" id="{F2E08D28-4900-438A-9A9E-812A8773F9D6}"/>
               </a:ext>
             </a:extLst>
           </p:cNvPr>
@@ -4337,7 +4593,7 @@
           <a:p>
             <a:r>
               <a:rPr lang="en-US" dirty="0"/>
-              <a:t>Why on earth would we ever use neural networks?</a:t>
+              <a:t>Why are we talking about Peer Review?</a:t>
             </a:r>
           </a:p>
         </p:txBody>
@@ -4347,7 +4603,7 @@
           <p:cNvPr id="3" name="Content Placeholder 2">
             <a:extLst>
               <a:ext uri="{FF2B5EF4-FFF2-40B4-BE49-F238E27FC236}">
-                <a16:creationId xmlns:a16="http://schemas.microsoft.com/office/drawing/2014/main" id="{8102F9B7-F222-46DC-A499-3DAD8C4B9707}"/>
+                <a16:creationId xmlns:a16="http://schemas.microsoft.com/office/drawing/2014/main" id="{82D17E00-4BB7-406D-B509-2FD70F95518F}"/>
               </a:ext>
             </a:extLst>
           </p:cNvPr>
@@ -4360,7 +4616,9 @@
         </p:nvSpPr>
         <p:spPr/>
         <p:txBody>
-          <a:bodyPr/>
+          <a:bodyPr>
+            <a:normAutofit/>
+          </a:bodyPr>
           <a:lstStyle/>
           <a:p>
             <a:pPr marL="0" indent="0">
@@ -4368,13 +4626,8 @@
             </a:pPr>
             <a:r>
               <a:rPr lang="en-US" dirty="0"/>
-              <a:t>Why is being able to recreate BMI a </a:t>
-            </a:r>
-            <a:r>
-              <a:rPr lang="en-US"/>
-              <a:t>big deal?</a:t>
-            </a:r>
-            <a:endParaRPr lang="en-US" dirty="0"/>
+              <a:t>We fed the neural network a bunch of noise, and it was still able to see through all of that noise to replicate a meaningful transformation…</a:t>
+            </a:r>
           </a:p>
           <a:p>
             <a:pPr marL="0" indent="0">
@@ -4388,7 +4641,25 @@
             </a:pPr>
             <a:r>
               <a:rPr lang="en-US" dirty="0"/>
-              <a:t>It means that Neural Networks are capable of creating complex transformations of raw variables that are useful for predicting outcomes.</a:t>
+              <a:t>One (should) say:</a:t>
+            </a:r>
+          </a:p>
+          <a:p>
+            <a:pPr marL="0" indent="0">
+              <a:buNone/>
+            </a:pPr>
+            <a:r>
+              <a:rPr lang="en-US" dirty="0"/>
+              <a:t>“But John, this is a deterministic outcome.”</a:t>
+            </a:r>
+          </a:p>
+          <a:p>
+            <a:pPr marL="0" indent="0">
+              <a:buNone/>
+            </a:pPr>
+            <a:r>
+              <a:rPr lang="en-US" dirty="0"/>
+              <a:t>And that’s correct—we can simply calculate it ourselves.  </a:t>
             </a:r>
           </a:p>
           <a:p>
@@ -4403,7 +4674,7 @@
             </a:pPr>
             <a:r>
               <a:rPr lang="en-US" dirty="0"/>
-              <a:t>It skips the peer review process entirely!</a:t>
+              <a:t>Can someone give me an example of a model that might use BMI?--</a:t>
             </a:r>
           </a:p>
         </p:txBody>
@@ -4411,7 +4682,7 @@
     </p:spTree>
     <p:extLst>
       <p:ext uri="{BB962C8B-B14F-4D97-AF65-F5344CB8AC3E}">
-        <p14:creationId xmlns:p14="http://schemas.microsoft.com/office/powerpoint/2010/main" val="4049497204"/>
+        <p14:creationId xmlns:p14="http://schemas.microsoft.com/office/powerpoint/2010/main" val="3292577258"/>
       </p:ext>
     </p:extLst>
   </p:cSld>
@@ -4443,6 +4714,236 @@
           <p:cNvPr id="2" name="Title 1">
             <a:extLst>
               <a:ext uri="{FF2B5EF4-FFF2-40B4-BE49-F238E27FC236}">
+                <a16:creationId xmlns:a16="http://schemas.microsoft.com/office/drawing/2014/main" id="{E947B2E4-5BB5-4B15-85ED-BE2D33C53592}"/>
+              </a:ext>
+            </a:extLst>
+          </p:cNvPr>
+          <p:cNvSpPr>
+            <a:spLocks noGrp="1"/>
+          </p:cNvSpPr>
+          <p:nvPr>
+            <p:ph type="title"/>
+          </p:nvPr>
+        </p:nvSpPr>
+        <p:spPr/>
+        <p:txBody>
+          <a:bodyPr/>
+          <a:lstStyle/>
+          <a:p>
+            <a:r>
+              <a:rPr lang="en-US" dirty="0"/>
+              <a:t>Why are we talking about Peer Review?</a:t>
+            </a:r>
+          </a:p>
+        </p:txBody>
+      </p:sp>
+      <p:sp>
+        <p:nvSpPr>
+          <p:cNvPr id="3" name="Content Placeholder 2">
+            <a:extLst>
+              <a:ext uri="{FF2B5EF4-FFF2-40B4-BE49-F238E27FC236}">
+                <a16:creationId xmlns:a16="http://schemas.microsoft.com/office/drawing/2014/main" id="{5163704A-5F0C-4BE8-8A13-7DB597909E9A}"/>
+              </a:ext>
+            </a:extLst>
+          </p:cNvPr>
+          <p:cNvSpPr>
+            <a:spLocks noGrp="1"/>
+          </p:cNvSpPr>
+          <p:nvPr>
+            <p:ph idx="1"/>
+          </p:nvPr>
+        </p:nvSpPr>
+        <p:spPr/>
+        <p:txBody>
+          <a:bodyPr>
+            <a:normAutofit/>
+          </a:bodyPr>
+          <a:lstStyle/>
+          <a:p>
+            <a:pPr marL="0" indent="0">
+              <a:buNone/>
+            </a:pPr>
+            <a:r>
+              <a:rPr lang="en-US" dirty="0"/>
+              <a:t>Our previous neural network had an input layer of 6, and two sequential hidden layers of size 16.  This was sufficient to predict BMI.</a:t>
+            </a:r>
+          </a:p>
+          <a:p>
+            <a:pPr marL="0" indent="0">
+              <a:buNone/>
+            </a:pPr>
+            <a:endParaRPr lang="en-US" dirty="0"/>
+          </a:p>
+          <a:p>
+            <a:pPr marL="0" indent="0">
+              <a:buNone/>
+            </a:pPr>
+            <a:r>
+              <a:rPr lang="en-US" dirty="0"/>
+              <a:t>Suppose instead, we added on another hidden layer, the other 4 variables were patient information (e.g. blood sugar, insulin resistance, lipids, etc.), and tried to predict the likelihood of a patient developing type 2 diabetes.</a:t>
+            </a:r>
+          </a:p>
+          <a:p>
+            <a:pPr marL="0" indent="0">
+              <a:buNone/>
+            </a:pPr>
+            <a:r>
+              <a:rPr lang="en-US" dirty="0"/>
+              <a:t>(we are abandoning determinism)</a:t>
+            </a:r>
+          </a:p>
+        </p:txBody>
+      </p:sp>
+    </p:spTree>
+    <p:extLst>
+      <p:ext uri="{BB962C8B-B14F-4D97-AF65-F5344CB8AC3E}">
+        <p14:creationId xmlns:p14="http://schemas.microsoft.com/office/powerpoint/2010/main" val="834176526"/>
+      </p:ext>
+    </p:extLst>
+  </p:cSld>
+  <p:clrMapOvr>
+    <a:masterClrMapping/>
+  </p:clrMapOvr>
+</p:sld>
+</file>
+
+<file path=ppt/slides/slide16.xml><?xml version="1.0" encoding="utf-8"?>
+<p:sld xmlns:a="http://schemas.openxmlformats.org/drawingml/2006/main" xmlns:r="http://schemas.openxmlformats.org/officeDocument/2006/relationships" xmlns:p="http://schemas.openxmlformats.org/presentationml/2006/main">
+  <p:cSld>
+    <p:spTree>
+      <p:nvGrpSpPr>
+        <p:cNvPr id="1" name=""/>
+        <p:cNvGrpSpPr/>
+        <p:nvPr/>
+      </p:nvGrpSpPr>
+      <p:grpSpPr>
+        <a:xfrm>
+          <a:off x="0" y="0"/>
+          <a:ext cx="0" cy="0"/>
+          <a:chOff x="0" y="0"/>
+          <a:chExt cx="0" cy="0"/>
+        </a:xfrm>
+      </p:grpSpPr>
+      <p:sp>
+        <p:nvSpPr>
+          <p:cNvPr id="2" name="Title 1">
+            <a:extLst>
+              <a:ext uri="{FF2B5EF4-FFF2-40B4-BE49-F238E27FC236}">
+                <a16:creationId xmlns:a16="http://schemas.microsoft.com/office/drawing/2014/main" id="{122C0CF3-55CA-4553-B781-8EC13DA86A68}"/>
+              </a:ext>
+            </a:extLst>
+          </p:cNvPr>
+          <p:cNvSpPr>
+            <a:spLocks noGrp="1"/>
+          </p:cNvSpPr>
+          <p:nvPr>
+            <p:ph type="title"/>
+          </p:nvPr>
+        </p:nvSpPr>
+        <p:spPr/>
+        <p:txBody>
+          <a:bodyPr/>
+          <a:lstStyle/>
+          <a:p>
+            <a:r>
+              <a:rPr lang="en-US" dirty="0"/>
+              <a:t>Why are we talking about Peer Review?</a:t>
+            </a:r>
+          </a:p>
+        </p:txBody>
+      </p:sp>
+      <p:sp>
+        <p:nvSpPr>
+          <p:cNvPr id="3" name="Content Placeholder 2">
+            <a:extLst>
+              <a:ext uri="{FF2B5EF4-FFF2-40B4-BE49-F238E27FC236}">
+                <a16:creationId xmlns:a16="http://schemas.microsoft.com/office/drawing/2014/main" id="{4233348B-5CAF-474D-81CD-51BF04E40F50}"/>
+              </a:ext>
+            </a:extLst>
+          </p:cNvPr>
+          <p:cNvSpPr>
+            <a:spLocks noGrp="1"/>
+          </p:cNvSpPr>
+          <p:nvPr>
+            <p:ph idx="1"/>
+          </p:nvPr>
+        </p:nvSpPr>
+        <p:spPr/>
+        <p:txBody>
+          <a:bodyPr/>
+          <a:lstStyle/>
+          <a:p>
+            <a:pPr marL="0" indent="0">
+              <a:buNone/>
+            </a:pPr>
+            <a:r>
+              <a:rPr lang="en-US" dirty="0"/>
+              <a:t>We know our NN is capable of simulating BMI by that point.  This complex architecture </a:t>
+            </a:r>
+            <a:r>
+              <a:rPr lang="en-US" b="1" i="1" dirty="0"/>
+              <a:t>enables neural networks to find meaningful, highly-predictive, complex transformations</a:t>
+            </a:r>
+            <a:r>
+              <a:rPr lang="en-US" dirty="0"/>
+              <a:t>--skipping peer review entirely.</a:t>
+            </a:r>
+          </a:p>
+          <a:p>
+            <a:pPr marL="0" indent="0">
+              <a:buNone/>
+            </a:pPr>
+            <a:endParaRPr lang="en-US" dirty="0"/>
+          </a:p>
+          <a:p>
+            <a:pPr marL="0" indent="0">
+              <a:buNone/>
+            </a:pPr>
+            <a:r>
+              <a:rPr lang="en-US" dirty="0"/>
+              <a:t>This is why Neural Nets are a big deal.</a:t>
+            </a:r>
+          </a:p>
+          <a:p>
+            <a:endParaRPr lang="en-US" dirty="0"/>
+          </a:p>
+        </p:txBody>
+      </p:sp>
+    </p:spTree>
+    <p:extLst>
+      <p:ext uri="{BB962C8B-B14F-4D97-AF65-F5344CB8AC3E}">
+        <p14:creationId xmlns:p14="http://schemas.microsoft.com/office/powerpoint/2010/main" val="2157088686"/>
+      </p:ext>
+    </p:extLst>
+  </p:cSld>
+  <p:clrMapOvr>
+    <a:masterClrMapping/>
+  </p:clrMapOvr>
+</p:sld>
+</file>
+
+<file path=ppt/slides/slide17.xml><?xml version="1.0" encoding="utf-8"?>
+<p:sld xmlns:a="http://schemas.openxmlformats.org/drawingml/2006/main" xmlns:r="http://schemas.openxmlformats.org/officeDocument/2006/relationships" xmlns:p="http://schemas.openxmlformats.org/presentationml/2006/main">
+  <p:cSld>
+    <p:spTree>
+      <p:nvGrpSpPr>
+        <p:cNvPr id="1" name=""/>
+        <p:cNvGrpSpPr/>
+        <p:nvPr/>
+      </p:nvGrpSpPr>
+      <p:grpSpPr>
+        <a:xfrm>
+          <a:off x="0" y="0"/>
+          <a:ext cx="0" cy="0"/>
+          <a:chOff x="0" y="0"/>
+          <a:chExt cx="0" cy="0"/>
+        </a:xfrm>
+      </p:grpSpPr>
+      <p:sp>
+        <p:nvSpPr>
+          <p:cNvPr id="2" name="Title 1">
+            <a:extLst>
+              <a:ext uri="{FF2B5EF4-FFF2-40B4-BE49-F238E27FC236}">
                 <a16:creationId xmlns:a16="http://schemas.microsoft.com/office/drawing/2014/main" id="{95C2E049-D66C-471B-836B-199719AD781A}"/>
               </a:ext>
             </a:extLst>
@@ -4461,7 +4962,7 @@
           <a:p>
             <a:r>
               <a:rPr lang="en-US" dirty="0"/>
-              <a:t>Questions</a:t>
+              <a:t>Follow-up Questions</a:t>
             </a:r>
           </a:p>
         </p:txBody>
@@ -4500,7 +5001,7 @@
           <a:p>
             <a:r>
               <a:rPr lang="en-US" i="1" dirty="0"/>
-              <a:t>Almost uniformly no</a:t>
+              <a:t>Almost uniformly no--black box</a:t>
             </a:r>
           </a:p>
           <a:p>
@@ -4515,7 +5016,7 @@
           <a:p>
             <a:r>
               <a:rPr lang="en-US" i="1" dirty="0"/>
-              <a:t>No</a:t>
+              <a:t>No.--black box</a:t>
             </a:r>
           </a:p>
           <a:p>
@@ -4530,7 +5031,7 @@
           <a:p>
             <a:r>
               <a:rPr lang="en-US" i="1" dirty="0"/>
-              <a:t>Nope</a:t>
+              <a:t>Nope--black box</a:t>
             </a:r>
           </a:p>
           <a:p>
@@ -4545,7 +5046,7 @@
           <a:p>
             <a:r>
               <a:rPr lang="en-US" i="1" dirty="0"/>
-              <a:t>Yes</a:t>
+              <a:t>Yes!... But they’re a black box.</a:t>
             </a:r>
           </a:p>
         </p:txBody>
@@ -4554,6 +5055,86 @@
     <p:extLst>
       <p:ext uri="{BB962C8B-B14F-4D97-AF65-F5344CB8AC3E}">
         <p14:creationId xmlns:p14="http://schemas.microsoft.com/office/powerpoint/2010/main" val="2539727428"/>
+      </p:ext>
+    </p:extLst>
+  </p:cSld>
+  <p:clrMapOvr>
+    <a:masterClrMapping/>
+  </p:clrMapOvr>
+</p:sld>
+</file>
+
+<file path=ppt/slides/slide18.xml><?xml version="1.0" encoding="utf-8"?>
+<p:sld xmlns:a="http://schemas.openxmlformats.org/drawingml/2006/main" xmlns:r="http://schemas.openxmlformats.org/officeDocument/2006/relationships" xmlns:p="http://schemas.openxmlformats.org/presentationml/2006/main">
+  <p:cSld>
+    <p:spTree>
+      <p:nvGrpSpPr>
+        <p:cNvPr id="1" name=""/>
+        <p:cNvGrpSpPr/>
+        <p:nvPr/>
+      </p:nvGrpSpPr>
+      <p:grpSpPr>
+        <a:xfrm>
+          <a:off x="0" y="0"/>
+          <a:ext cx="0" cy="0"/>
+          <a:chOff x="0" y="0"/>
+          <a:chExt cx="0" cy="0"/>
+        </a:xfrm>
+      </p:grpSpPr>
+      <p:sp>
+        <p:nvSpPr>
+          <p:cNvPr id="3" name="Content Placeholder 2">
+            <a:extLst>
+              <a:ext uri="{FF2B5EF4-FFF2-40B4-BE49-F238E27FC236}">
+                <a16:creationId xmlns:a16="http://schemas.microsoft.com/office/drawing/2014/main" id="{BE6179D1-CD7B-4006-ACA0-241DA0F4EA7F}"/>
+              </a:ext>
+            </a:extLst>
+          </p:cNvPr>
+          <p:cNvSpPr>
+            <a:spLocks noGrp="1"/>
+          </p:cNvSpPr>
+          <p:nvPr>
+            <p:ph idx="1"/>
+          </p:nvPr>
+        </p:nvSpPr>
+        <p:spPr>
+          <a:xfrm>
+            <a:off x="838200" y="743712"/>
+            <a:ext cx="10515600" cy="5433251"/>
+          </a:xfrm>
+        </p:spPr>
+        <p:txBody>
+          <a:bodyPr>
+            <a:normAutofit/>
+          </a:bodyPr>
+          <a:lstStyle/>
+          <a:p>
+            <a:pPr marL="0" indent="0" algn="ctr">
+              <a:buNone/>
+            </a:pPr>
+            <a:endParaRPr lang="en-US" sz="6400" dirty="0"/>
+          </a:p>
+          <a:p>
+            <a:pPr marL="0" indent="0" algn="ctr">
+              <a:buNone/>
+            </a:pPr>
+            <a:endParaRPr lang="en-US" sz="6400" dirty="0"/>
+          </a:p>
+          <a:p>
+            <a:pPr marL="0" indent="0" algn="ctr">
+              <a:buNone/>
+            </a:pPr>
+            <a:r>
+              <a:rPr lang="en-US" sz="6400" dirty="0"/>
+              <a:t>Questions?</a:t>
+            </a:r>
+          </a:p>
+        </p:txBody>
+      </p:sp>
+    </p:spTree>
+    <p:extLst>
+      <p:ext uri="{BB962C8B-B14F-4D97-AF65-F5344CB8AC3E}">
+        <p14:creationId xmlns:p14="http://schemas.microsoft.com/office/powerpoint/2010/main" val="416954271"/>
       </p:ext>
     </p:extLst>
   </p:cSld>
@@ -4671,8 +5252,14 @@
           <a:p>
             <a:r>
               <a:rPr lang="en-US" dirty="0"/>
-              <a:t>Return to BMI</a:t>
-            </a:r>
+              <a:t>Slight detour</a:t>
+            </a:r>
+          </a:p>
+          <a:p>
+            <a:pPr marL="0" indent="0">
+              <a:buNone/>
+            </a:pPr>
+            <a:endParaRPr lang="en-US" dirty="0"/>
           </a:p>
           <a:p>
             <a:endParaRPr lang="en-US" dirty="0"/>
@@ -4839,7 +5426,7 @@
           <p:cNvPr id="2" name="Title 1">
             <a:extLst>
               <a:ext uri="{FF2B5EF4-FFF2-40B4-BE49-F238E27FC236}">
-                <a16:creationId xmlns:a16="http://schemas.microsoft.com/office/drawing/2014/main" id="{D15E19D0-0460-49AC-88EA-22E3A6713A36}"/>
+                <a16:creationId xmlns:a16="http://schemas.microsoft.com/office/drawing/2014/main" id="{D4CFEE06-FD40-4F6B-A085-A26A580CEB4A}"/>
               </a:ext>
             </a:extLst>
           </p:cNvPr>
@@ -4857,8 +5444,13 @@
           <a:p>
             <a:r>
               <a:rPr lang="en-US" dirty="0"/>
-              <a:t>Question/Challenge</a:t>
-            </a:r>
+              <a:t>What is Body Mass Index (BMI)? </a:t>
+            </a:r>
+            <a:r>
+              <a:rPr lang="en-US"/>
+              <a:t>(answers)</a:t>
+            </a:r>
+            <a:endParaRPr lang="en-US" dirty="0"/>
           </a:p>
         </p:txBody>
       </p:sp>
@@ -4867,7 +5459,7 @@
           <p:cNvPr id="3" name="Content Placeholder 2">
             <a:extLst>
               <a:ext uri="{FF2B5EF4-FFF2-40B4-BE49-F238E27FC236}">
-                <a16:creationId xmlns:a16="http://schemas.microsoft.com/office/drawing/2014/main" id="{1B9C0F56-AE10-49B3-A313-2DD8746D5FD6}"/>
+                <a16:creationId xmlns:a16="http://schemas.microsoft.com/office/drawing/2014/main" id="{0C156000-5A15-4669-8EB1-E299ED923D3A}"/>
               </a:ext>
             </a:extLst>
           </p:cNvPr>
@@ -4880,50 +5472,72 @@
         </p:nvSpPr>
         <p:spPr/>
         <p:txBody>
-          <a:bodyPr/>
-          <a:lstStyle/>
-          <a:p>
-            <a:pPr marL="0" indent="0">
+          <a:bodyPr>
+            <a:normAutofit/>
+          </a:bodyPr>
+          <a:lstStyle/>
+          <a:p>
+            <a:pPr marL="0" indent="0" algn="ctr">
               <a:buNone/>
             </a:pPr>
             <a:r>
-              <a:rPr lang="en-US" dirty="0"/>
-              <a:t>Can a Neural Network calculate BMI?</a:t>
-            </a:r>
-          </a:p>
-          <a:p>
-            <a:pPr marL="0" indent="0">
+              <a:rPr lang="en-US" sz="3200" dirty="0"/>
+              <a:t>Specifically: mass / height</a:t>
+            </a:r>
+            <a:r>
+              <a:rPr lang="en-US" sz="3200" baseline="30000" dirty="0"/>
+              <a:t>2</a:t>
+            </a:r>
+          </a:p>
+          <a:p>
+            <a:pPr marL="0" indent="0" algn="ctr">
               <a:buNone/>
             </a:pPr>
-            <a:endParaRPr lang="en-US" dirty="0"/>
+            <a:endParaRPr lang="en-US" sz="3200" dirty="0"/>
           </a:p>
           <a:p>
             <a:pPr marL="0" indent="0" algn="ctr">
               <a:buNone/>
             </a:pPr>
             <a:r>
-              <a:rPr lang="en-US" i="1" dirty="0"/>
-              <a:t>[switch to code]</a:t>
+              <a:rPr lang="en-US" sz="3200" dirty="0"/>
+              <a:t>Proxy for: obesity</a:t>
             </a:r>
           </a:p>
           <a:p>
             <a:pPr marL="0" indent="0" algn="ctr">
               <a:buNone/>
             </a:pPr>
-            <a:endParaRPr lang="en-US" i="1" dirty="0"/>
-          </a:p>
-          <a:p>
-            <a:pPr marL="0" indent="0">
+            <a:endParaRPr lang="en-US" sz="3200" dirty="0"/>
+          </a:p>
+          <a:p>
+            <a:pPr marL="0" indent="0" algn="ctr">
               <a:buNone/>
             </a:pPr>
-            <a:endParaRPr lang="en-US" i="1" dirty="0"/>
+            <a:r>
+              <a:rPr lang="en-US" sz="3200" dirty="0"/>
+              <a:t>More generally, it’s an example of a: </a:t>
+            </a:r>
+          </a:p>
+          <a:p>
+            <a:pPr marL="0" indent="0" algn="ctr">
+              <a:buNone/>
+            </a:pPr>
+            <a:r>
+              <a:rPr lang="en-US" sz="6400" b="1" dirty="0"/>
+              <a:t>Transformation</a:t>
+            </a:r>
+            <a:r>
+              <a:rPr lang="en-US" sz="6400" dirty="0"/>
+              <a:t>.</a:t>
+            </a:r>
           </a:p>
         </p:txBody>
       </p:sp>
     </p:spTree>
     <p:extLst>
       <p:ext uri="{BB962C8B-B14F-4D97-AF65-F5344CB8AC3E}">
-        <p14:creationId xmlns:p14="http://schemas.microsoft.com/office/powerpoint/2010/main" val="828297836"/>
+        <p14:creationId xmlns:p14="http://schemas.microsoft.com/office/powerpoint/2010/main" val="2305860772"/>
       </p:ext>
     </p:extLst>
   </p:cSld>
@@ -5014,34 +5628,19 @@
             <a:endParaRPr lang="en-US" dirty="0"/>
           </a:p>
           <a:p>
-            <a:pPr marL="0" indent="0">
+            <a:pPr marL="0" indent="0" algn="ctr">
               <a:buNone/>
             </a:pPr>
-            <a:endParaRPr lang="en-US" dirty="0"/>
+            <a:r>
+              <a:rPr lang="en-US" i="1" dirty="0"/>
+              <a:t>[switch to code]</a:t>
+            </a:r>
           </a:p>
           <a:p>
             <a:pPr marL="0" indent="0" algn="ctr">
               <a:buNone/>
             </a:pPr>
-            <a:r>
-              <a:rPr lang="en-US" sz="6600" i="1" dirty="0"/>
-              <a:t>YES!</a:t>
-            </a:r>
-          </a:p>
-          <a:p>
-            <a:pPr marL="0" indent="0" algn="ctr">
-              <a:buNone/>
-            </a:pPr>
-            <a:endParaRPr lang="en-US" dirty="0"/>
-          </a:p>
-          <a:p>
-            <a:pPr marL="0" indent="0">
-              <a:buNone/>
-            </a:pPr>
-            <a:r>
-              <a:rPr lang="en-US" dirty="0"/>
-              <a:t>I would argue this is a big deal.  Before I get to that, let’s talk about what’s happening happens in a neural network.</a:t>
-            </a:r>
+            <a:endParaRPr lang="en-US" i="1" dirty="0"/>
           </a:p>
           <a:p>
             <a:pPr marL="0" indent="0">
@@ -5054,7 +5653,7 @@
     </p:spTree>
     <p:extLst>
       <p:ext uri="{BB962C8B-B14F-4D97-AF65-F5344CB8AC3E}">
-        <p14:creationId xmlns:p14="http://schemas.microsoft.com/office/powerpoint/2010/main" val="1028198939"/>
+        <p14:creationId xmlns:p14="http://schemas.microsoft.com/office/powerpoint/2010/main" val="828297836"/>
       </p:ext>
     </p:extLst>
   </p:cSld>
@@ -5086,7 +5685,7 @@
           <p:cNvPr id="2" name="Title 1">
             <a:extLst>
               <a:ext uri="{FF2B5EF4-FFF2-40B4-BE49-F238E27FC236}">
-                <a16:creationId xmlns:a16="http://schemas.microsoft.com/office/drawing/2014/main" id="{9FDAD1F5-FF3E-4A7E-8FD0-2301EFC72146}"/>
+                <a16:creationId xmlns:a16="http://schemas.microsoft.com/office/drawing/2014/main" id="{D15E19D0-0460-49AC-88EA-22E3A6713A36}"/>
               </a:ext>
             </a:extLst>
           </p:cNvPr>
@@ -5104,163 +5703,93 @@
           <a:p>
             <a:r>
               <a:rPr lang="en-US" dirty="0"/>
-              <a:t>Anatomy of a fully connected neural network</a:t>
-            </a:r>
-          </a:p>
-        </p:txBody>
-      </p:sp>
-      <p:pic>
-        <p:nvPicPr>
-          <p:cNvPr id="5" name="Content Placeholder 4">
-            <a:extLst>
-              <a:ext uri="{FF2B5EF4-FFF2-40B4-BE49-F238E27FC236}">
-                <a16:creationId xmlns:a16="http://schemas.microsoft.com/office/drawing/2014/main" id="{104C6E1E-EB4C-44EB-9228-565C02B70BB3}"/>
-              </a:ext>
-            </a:extLst>
-          </p:cNvPr>
-          <p:cNvPicPr>
-            <a:picLocks noGrp="1" noChangeAspect="1"/>
-          </p:cNvPicPr>
+              <a:t>Question/Challenge</a:t>
+            </a:r>
+          </a:p>
+        </p:txBody>
+      </p:sp>
+      <p:sp>
+        <p:nvSpPr>
+          <p:cNvPr id="3" name="Content Placeholder 2">
+            <a:extLst>
+              <a:ext uri="{FF2B5EF4-FFF2-40B4-BE49-F238E27FC236}">
+                <a16:creationId xmlns:a16="http://schemas.microsoft.com/office/drawing/2014/main" id="{1B9C0F56-AE10-49B3-A313-2DD8746D5FD6}"/>
+              </a:ext>
+            </a:extLst>
+          </p:cNvPr>
+          <p:cNvSpPr>
+            <a:spLocks noGrp="1"/>
+          </p:cNvSpPr>
           <p:nvPr>
             <p:ph idx="1"/>
           </p:nvPr>
-        </p:nvPicPr>
-        <p:blipFill>
-          <a:blip r:embed="rId2">
-            <a:extLst>
-              <a:ext uri="{28A0092B-C50C-407E-A947-70E740481C1C}">
-                <a14:useLocalDpi xmlns:a14="http://schemas.microsoft.com/office/drawing/2010/main" val="0"/>
-              </a:ext>
-            </a:extLst>
-          </a:blip>
-          <a:stretch>
-            <a:fillRect/>
-          </a:stretch>
-        </p:blipFill>
-        <p:spPr>
-          <a:xfrm>
-            <a:off x="838200" y="1709737"/>
-            <a:ext cx="3500718" cy="4212531"/>
-          </a:xfrm>
-        </p:spPr>
-      </p:pic>
-      <p:sp>
-        <p:nvSpPr>
-          <p:cNvPr id="6" name="TextBox 5">
-            <a:extLst>
-              <a:ext uri="{FF2B5EF4-FFF2-40B4-BE49-F238E27FC236}">
-                <a16:creationId xmlns:a16="http://schemas.microsoft.com/office/drawing/2014/main" id="{E2B47211-B897-4CEF-853A-E6E11C47FFDC}"/>
-              </a:ext>
-            </a:extLst>
-          </p:cNvPr>
-          <p:cNvSpPr txBox="1"/>
-          <p:nvPr/>
-        </p:nvSpPr>
-        <p:spPr>
-          <a:xfrm>
-            <a:off x="4966447" y="1709737"/>
-            <a:ext cx="6387353" cy="4154984"/>
-          </a:xfrm>
-          <a:prstGeom prst="rect">
-            <a:avLst/>
-          </a:prstGeom>
-          <a:noFill/>
-        </p:spPr>
-        <p:txBody>
-          <a:bodyPr wrap="square" rtlCol="0">
-            <a:spAutoFit/>
+        </p:nvSpPr>
+        <p:spPr/>
+        <p:txBody>
+          <a:bodyPr>
+            <a:normAutofit/>
           </a:bodyPr>
           <a:lstStyle/>
           <a:p>
-            <a:r>
-              <a:rPr lang="en-US" sz="2400" dirty="0"/>
-              <a:t>It is composed of</a:t>
-            </a:r>
-          </a:p>
-          <a:p>
-            <a:pPr marL="342900" indent="-342900">
-              <a:buFont typeface="Arial" panose="020B0604020202020204" pitchFamily="34" charset="0"/>
-              <a:buChar char="•"/>
+            <a:pPr marL="0" indent="0">
+              <a:buNone/>
             </a:pPr>
             <a:r>
-              <a:rPr lang="en-US" sz="2400" dirty="0"/>
-              <a:t>An input layer,</a:t>
-            </a:r>
-          </a:p>
-          <a:p>
-            <a:pPr marL="342900" indent="-342900">
-              <a:buFont typeface="Arial" panose="020B0604020202020204" pitchFamily="34" charset="0"/>
-              <a:buChar char="•"/>
+              <a:rPr lang="en-US" dirty="0"/>
+              <a:t>Can a Neural Network calculate BMI?</a:t>
+            </a:r>
+          </a:p>
+          <a:p>
+            <a:pPr marL="0" indent="0">
+              <a:buNone/>
             </a:pPr>
-            <a:r>
-              <a:rPr lang="en-US" sz="2400" dirty="0"/>
-              <a:t>A number of hidden layers, and</a:t>
-            </a:r>
-          </a:p>
-          <a:p>
-            <a:pPr marL="342900" indent="-342900">
-              <a:buFont typeface="Arial" panose="020B0604020202020204" pitchFamily="34" charset="0"/>
-              <a:buChar char="•"/>
+            <a:endParaRPr lang="en-US" dirty="0"/>
+          </a:p>
+          <a:p>
+            <a:pPr marL="0" indent="0" algn="ctr">
+              <a:buNone/>
             </a:pPr>
             <a:r>
-              <a:rPr lang="en-US" sz="2400" dirty="0"/>
-              <a:t>An output layer</a:t>
-            </a:r>
-          </a:p>
-          <a:p>
-            <a:endParaRPr lang="en-US" sz="2400" dirty="0"/>
-          </a:p>
-          <a:p>
-            <a:r>
-              <a:rPr lang="en-US" sz="2400" dirty="0"/>
-              <a:t>The lines between represent activations—number values in the </a:t>
-            </a:r>
-            <a:r>
-              <a:rPr lang="en-US" sz="2400" dirty="0">
-                <a:hlinkClick r:id="rId3"/>
-              </a:rPr>
-              <a:t>Real Numbers</a:t>
-            </a:r>
-            <a:r>
-              <a:rPr lang="en-US" sz="2400" dirty="0"/>
-              <a:t> (-∞,∞)</a:t>
-            </a:r>
-          </a:p>
-          <a:p>
-            <a:endParaRPr lang="en-US" sz="2400" dirty="0"/>
-          </a:p>
-          <a:p>
-            <a:r>
-              <a:rPr lang="en-US" sz="2400" dirty="0"/>
-              <a:t>A N-layer neural network has N-1 hidden layers.  </a:t>
-            </a:r>
-          </a:p>
-          <a:p>
-            <a:r>
-              <a:rPr lang="en-US" sz="2400" dirty="0"/>
-              <a:t>The image to the left is a 2-layer NN.</a:t>
-            </a:r>
-          </a:p>
-          <a:p>
-            <a:r>
-              <a:rPr lang="en-US" sz="2400" dirty="0"/>
-              <a:t>The “1</a:t>
-            </a:r>
-            <a:r>
-              <a:rPr lang="en-US" sz="2400" baseline="30000" dirty="0"/>
-              <a:t>st</a:t>
-            </a:r>
-            <a:r>
-              <a:rPr lang="en-US" sz="2400" dirty="0"/>
-              <a:t> layer” is the first non-input layer.</a:t>
-            </a:r>
+              <a:rPr lang="en-US" dirty="0"/>
+              <a:t>(to a high degree)</a:t>
+            </a:r>
+          </a:p>
+          <a:p>
+            <a:pPr marL="0" indent="0" algn="ctr">
+              <a:buNone/>
+            </a:pPr>
+            <a:r>
+              <a:rPr lang="en-US" sz="6600" i="1" dirty="0"/>
+              <a:t>YES!</a:t>
+            </a:r>
+          </a:p>
+          <a:p>
+            <a:pPr marL="0" indent="0" algn="ctr">
+              <a:buNone/>
+            </a:pPr>
+            <a:endParaRPr lang="en-US" dirty="0"/>
+          </a:p>
+          <a:p>
+            <a:pPr marL="0" indent="0">
+              <a:buNone/>
+            </a:pPr>
+            <a:r>
+              <a:rPr lang="en-US" dirty="0"/>
+              <a:t>I would argue this is a big deal.  Before I get to that, let’s talk about what’s happening happens in a neural network.</a:t>
+            </a:r>
+          </a:p>
+          <a:p>
+            <a:pPr marL="0" indent="0">
+              <a:buNone/>
+            </a:pPr>
+            <a:endParaRPr lang="en-US" i="1" dirty="0"/>
           </a:p>
         </p:txBody>
       </p:sp>
     </p:spTree>
     <p:extLst>
       <p:ext uri="{BB962C8B-B14F-4D97-AF65-F5344CB8AC3E}">
-        <p14:creationId xmlns:p14="http://schemas.microsoft.com/office/powerpoint/2010/main" val="3040642139"/>
+        <p14:creationId xmlns:p14="http://schemas.microsoft.com/office/powerpoint/2010/main" val="1028198939"/>
       </p:ext>
     </p:extLst>
   </p:cSld>
@@ -5310,7 +5839,7 @@
           <a:p>
             <a:r>
               <a:rPr lang="en-US" dirty="0"/>
-              <a:t>Input Layer Anatomy</a:t>
+              <a:t>Anatomy of a fully connected neural network</a:t>
             </a:r>
           </a:p>
         </p:txBody>
@@ -5364,8 +5893,8 @@
         </p:nvSpPr>
         <p:spPr>
           <a:xfrm>
-            <a:off x="5791200" y="1709737"/>
-            <a:ext cx="5562600" cy="3416320"/>
+            <a:off x="4966447" y="1709737"/>
+            <a:ext cx="6387353" cy="4524315"/>
           </a:xfrm>
           <a:prstGeom prst="rect">
             <a:avLst/>
@@ -5380,7 +5909,37 @@
           <a:p>
             <a:r>
               <a:rPr lang="en-US" sz="2400" dirty="0"/>
-              <a:t>The input layer is analogous to the input dataset.  That is, there will be as many nodes as there are variables for a given observation.  This example has three input variables (intercept not pictured) .</a:t>
+              <a:t>It is composed of</a:t>
+            </a:r>
+          </a:p>
+          <a:p>
+            <a:pPr marL="342900" indent="-342900">
+              <a:buFont typeface="Arial" panose="020B0604020202020204" pitchFamily="34" charset="0"/>
+              <a:buChar char="•"/>
+            </a:pPr>
+            <a:r>
+              <a:rPr lang="en-US" sz="2400" dirty="0"/>
+              <a:t>An input layer,</a:t>
+            </a:r>
+          </a:p>
+          <a:p>
+            <a:pPr marL="342900" indent="-342900">
+              <a:buFont typeface="Arial" panose="020B0604020202020204" pitchFamily="34" charset="0"/>
+              <a:buChar char="•"/>
+            </a:pPr>
+            <a:r>
+              <a:rPr lang="en-US" sz="2400" dirty="0"/>
+              <a:t>A number of hidden layers, and</a:t>
+            </a:r>
+          </a:p>
+          <a:p>
+            <a:pPr marL="342900" indent="-342900">
+              <a:buFont typeface="Arial" panose="020B0604020202020204" pitchFamily="34" charset="0"/>
+              <a:buChar char="•"/>
+            </a:pPr>
+            <a:r>
+              <a:rPr lang="en-US" sz="2400" dirty="0"/>
+              <a:t>An output layer</a:t>
             </a:r>
           </a:p>
           <a:p>
@@ -5389,15 +5948,46 @@
           <a:p>
             <a:r>
               <a:rPr lang="en-US" sz="2400" dirty="0"/>
-              <a:t>The values of X (often indexed as the zero-</a:t>
-            </a:r>
-            <a:r>
-              <a:rPr lang="en-US" sz="2400" dirty="0" err="1"/>
-              <a:t>th</a:t>
-            </a:r>
+              <a:t>A N-layer neural network has N-1 hidden layers.  </a:t>
+            </a:r>
+          </a:p>
+          <a:p>
             <a:r>
               <a:rPr lang="en-US" sz="2400" dirty="0"/>
-              <a:t> activation) are passed to the first hidden layer.</a:t>
+              <a:t>The image to the left is a 2-layer NN (the input layer is not counted).</a:t>
+            </a:r>
+          </a:p>
+          <a:p>
+            <a:r>
+              <a:rPr lang="en-US" sz="2400" dirty="0"/>
+              <a:t>The “1</a:t>
+            </a:r>
+            <a:r>
+              <a:rPr lang="en-US" sz="2400" baseline="30000" dirty="0"/>
+              <a:t>st</a:t>
+            </a:r>
+            <a:r>
+              <a:rPr lang="en-US" sz="2400" dirty="0"/>
+              <a:t> layer” is the first non-input layer.</a:t>
+            </a:r>
+          </a:p>
+          <a:p>
+            <a:endParaRPr lang="en-US" sz="2400" dirty="0"/>
+          </a:p>
+          <a:p>
+            <a:r>
+              <a:rPr lang="en-US" sz="2400" dirty="0"/>
+              <a:t>The lines between represent activations—number values in the </a:t>
+            </a:r>
+            <a:r>
+              <a:rPr lang="en-US" sz="2400" dirty="0">
+                <a:hlinkClick r:id="rId3"/>
+              </a:rPr>
+              <a:t>Real Numbers</a:t>
+            </a:r>
+            <a:r>
+              <a:rPr lang="en-US" sz="2400" dirty="0"/>
+              <a:t> (-∞,∞)</a:t>
             </a:r>
           </a:p>
         </p:txBody>
@@ -5405,7 +5995,7 @@
     </p:spTree>
     <p:extLst>
       <p:ext uri="{BB962C8B-B14F-4D97-AF65-F5344CB8AC3E}">
-        <p14:creationId xmlns:p14="http://schemas.microsoft.com/office/powerpoint/2010/main" val="1032170421"/>
+        <p14:creationId xmlns:p14="http://schemas.microsoft.com/office/powerpoint/2010/main" val="3040642139"/>
       </p:ext>
     </p:extLst>
   </p:cSld>
@@ -5455,7 +6045,7 @@
           <a:p>
             <a:r>
               <a:rPr lang="en-US" dirty="0"/>
-              <a:t>Hidden Layer Anatomy—there can be several</a:t>
+              <a:t>Input Layer Anatomy</a:t>
             </a:r>
           </a:p>
         </p:txBody>
@@ -5509,8 +6099,8 @@
         </p:nvSpPr>
         <p:spPr>
           <a:xfrm>
-            <a:off x="4880611" y="1435417"/>
-            <a:ext cx="6473190" cy="5262979"/>
+            <a:off x="5791200" y="1709737"/>
+            <a:ext cx="5562600" cy="3416320"/>
           </a:xfrm>
           <a:prstGeom prst="rect">
             <a:avLst/>
@@ -5525,7 +6115,7 @@
           <a:p>
             <a:r>
               <a:rPr lang="en-US" sz="2400" dirty="0"/>
-              <a:t>The number of nodes in a hidden layer(s) is a hyperparameter, i.e. arbitrarily chosen to maximize performance.</a:t>
+              <a:t>The input layer is analogous to the input dataset (for one observation).  That is, there will be as many nodes as there are variables.  This example has three input variables (intercept not pictured).</a:t>
             </a:r>
           </a:p>
           <a:p>
@@ -5534,68 +6124,15 @@
           <a:p>
             <a:r>
               <a:rPr lang="en-US" sz="2400" dirty="0"/>
-              <a:t>Within each node within a hidden layer two things occur (in order):</a:t>
-            </a:r>
-          </a:p>
-          <a:p>
-            <a:pPr marL="457200" indent="-457200">
-              <a:buFont typeface="+mj-lt"/>
-              <a:buAutoNum type="arabicPeriod"/>
-            </a:pPr>
+              <a:t>The values of X (often indexed as the zero-</a:t>
+            </a:r>
+            <a:r>
+              <a:rPr lang="en-US" sz="2400" dirty="0" err="1"/>
+              <a:t>th</a:t>
+            </a:r>
             <a:r>
               <a:rPr lang="en-US" sz="2400" dirty="0"/>
-              <a:t>Linear regression using the input activation</a:t>
-            </a:r>
-          </a:p>
-          <a:p>
-            <a:pPr marL="457200" indent="-457200">
-              <a:buFont typeface="+mj-lt"/>
-              <a:buAutoNum type="arabicPeriod"/>
-            </a:pPr>
-            <a:r>
-              <a:rPr lang="en-US" sz="2400" dirty="0"/>
-              <a:t>Output from that regression passes through an </a:t>
-            </a:r>
-            <a:r>
-              <a:rPr lang="en-US" sz="2400" dirty="0">
-                <a:hlinkClick r:id="rId3"/>
-              </a:rPr>
-              <a:t>activation function</a:t>
-            </a:r>
-            <a:r>
-              <a:rPr lang="en-US" sz="2400" dirty="0"/>
-              <a:t>.</a:t>
-            </a:r>
-          </a:p>
-          <a:p>
-            <a:r>
-              <a:rPr lang="en-US" sz="2400" dirty="0"/>
-              <a:t>The output (the new activation) from this is then passed as the next layer’s input activation.</a:t>
-            </a:r>
-          </a:p>
-          <a:p>
-            <a:endParaRPr lang="en-US" sz="2400" dirty="0"/>
-          </a:p>
-          <a:p>
-            <a:r>
-              <a:rPr lang="en-US" sz="2400" dirty="0"/>
-              <a:t>Each node has </a:t>
-            </a:r>
-            <a:r>
-              <a:rPr lang="en-US" sz="2400" b="1" dirty="0"/>
-              <a:t>different parameters</a:t>
-            </a:r>
-            <a:r>
-              <a:rPr lang="en-US" sz="2400" dirty="0"/>
-              <a:t>, but uses the same </a:t>
-            </a:r>
-            <a:r>
-              <a:rPr lang="en-US" sz="2400" b="1" dirty="0"/>
-              <a:t>input activations</a:t>
-            </a:r>
-            <a:r>
-              <a:rPr lang="en-US" sz="2400" dirty="0"/>
-              <a:t> within a given layer.</a:t>
+              <a:t> activation) are passed to the first hidden layer.</a:t>
             </a:r>
           </a:p>
         </p:txBody>
@@ -5603,7 +6140,7 @@
     </p:spTree>
     <p:extLst>
       <p:ext uri="{BB962C8B-B14F-4D97-AF65-F5344CB8AC3E}">
-        <p14:creationId xmlns:p14="http://schemas.microsoft.com/office/powerpoint/2010/main" val="3772906805"/>
+        <p14:creationId xmlns:p14="http://schemas.microsoft.com/office/powerpoint/2010/main" val="1032170421"/>
       </p:ext>
     </p:extLst>
   </p:cSld>
@@ -5653,7 +6190,7 @@
           <a:p>
             <a:r>
               <a:rPr lang="en-US" dirty="0"/>
-              <a:t>Hidden Layer Anatomy, continued</a:t>
+              <a:t>Hidden Layer Anatomy—there can be several</a:t>
             </a:r>
           </a:p>
         </p:txBody>
@@ -5707,8 +6244,8 @@
         </p:nvSpPr>
         <p:spPr>
           <a:xfrm>
-            <a:off x="5145741" y="1709737"/>
-            <a:ext cx="6208059" cy="1938992"/>
+            <a:off x="4880611" y="1435417"/>
+            <a:ext cx="6473190" cy="5262979"/>
           </a:xfrm>
           <a:prstGeom prst="rect">
             <a:avLst/>
@@ -5723,7 +6260,7 @@
           <a:p>
             <a:r>
               <a:rPr lang="en-US" sz="2400" dirty="0"/>
-              <a:t>The most common activation function is the rectified linear unit (RELU):</a:t>
+              <a:t>The number of nodes in a hidden layer(s) is a hyperparameter, i.e. arbitrarily chosen to maximize performance.</a:t>
             </a:r>
           </a:p>
           <a:p>
@@ -5732,57 +6269,76 @@
           <a:p>
             <a:r>
               <a:rPr lang="en-US" sz="2400" dirty="0"/>
-              <a:t>RELU(x) = </a:t>
-            </a:r>
-          </a:p>
-          <a:p>
+              <a:t>Within each node within a hidden layer two things occur (in order):</a:t>
+            </a:r>
+          </a:p>
+          <a:p>
+            <a:pPr marL="457200" indent="-457200">
+              <a:buFont typeface="+mj-lt"/>
+              <a:buAutoNum type="arabicPeriod"/>
+            </a:pPr>
             <a:r>
               <a:rPr lang="en-US" sz="2400" dirty="0"/>
-              <a:t>Max(0,x)</a:t>
-            </a:r>
-          </a:p>
-        </p:txBody>
-      </p:sp>
-      <p:pic>
-        <p:nvPicPr>
-          <p:cNvPr id="7" name="Picture 6">
-            <a:extLst>
-              <a:ext uri="{FF2B5EF4-FFF2-40B4-BE49-F238E27FC236}">
-                <a16:creationId xmlns:a16="http://schemas.microsoft.com/office/drawing/2014/main" id="{717E11FC-1CF9-440E-8244-CF6BA8FE35D6}"/>
-              </a:ext>
-            </a:extLst>
-          </p:cNvPr>
-          <p:cNvPicPr>
-            <a:picLocks noChangeAspect="1"/>
-          </p:cNvPicPr>
-          <p:nvPr/>
-        </p:nvPicPr>
-        <p:blipFill>
-          <a:blip r:embed="rId3">
-            <a:extLst>
-              <a:ext uri="{28A0092B-C50C-407E-A947-70E740481C1C}">
-                <a14:useLocalDpi xmlns:a14="http://schemas.microsoft.com/office/drawing/2010/main" val="0"/>
-              </a:ext>
-            </a:extLst>
-          </a:blip>
-          <a:stretch>
-            <a:fillRect/>
-          </a:stretch>
-        </p:blipFill>
-        <p:spPr>
-          <a:xfrm>
-            <a:off x="7853084" y="2454217"/>
-            <a:ext cx="4212531" cy="4212531"/>
-          </a:xfrm>
-          <a:prstGeom prst="rect">
-            <a:avLst/>
-          </a:prstGeom>
-        </p:spPr>
-      </p:pic>
+              <a:t>Linear regression using the input activation</a:t>
+            </a:r>
+          </a:p>
+          <a:p>
+            <a:pPr marL="457200" indent="-457200">
+              <a:buFont typeface="+mj-lt"/>
+              <a:buAutoNum type="arabicPeriod"/>
+            </a:pPr>
+            <a:r>
+              <a:rPr lang="en-US" sz="2400" dirty="0"/>
+              <a:t>Output from that regression passes through an </a:t>
+            </a:r>
+            <a:r>
+              <a:rPr lang="en-US" sz="2400" dirty="0">
+                <a:hlinkClick r:id="rId3"/>
+              </a:rPr>
+              <a:t>activation function</a:t>
+            </a:r>
+            <a:r>
+              <a:rPr lang="en-US" sz="2400" dirty="0"/>
+              <a:t>.</a:t>
+            </a:r>
+          </a:p>
+          <a:p>
+            <a:r>
+              <a:rPr lang="en-US" sz="2400" dirty="0"/>
+              <a:t>The output (the new activation) from this is then passed as the next layer’s input activation.</a:t>
+            </a:r>
+          </a:p>
+          <a:p>
+            <a:endParaRPr lang="en-US" sz="2400" dirty="0"/>
+          </a:p>
+          <a:p>
+            <a:r>
+              <a:rPr lang="en-US" sz="2400" dirty="0"/>
+              <a:t>Each node has </a:t>
+            </a:r>
+            <a:r>
+              <a:rPr lang="en-US" sz="2400" b="1" dirty="0"/>
+              <a:t>different parameters</a:t>
+            </a:r>
+            <a:r>
+              <a:rPr lang="en-US" sz="2400" dirty="0"/>
+              <a:t>, but uses the same </a:t>
+            </a:r>
+            <a:r>
+              <a:rPr lang="en-US" sz="2400" b="1" dirty="0"/>
+              <a:t>input activations</a:t>
+            </a:r>
+            <a:r>
+              <a:rPr lang="en-US" sz="2400" dirty="0"/>
+              <a:t> within a given layer.</a:t>
+            </a:r>
+          </a:p>
+        </p:txBody>
+      </p:sp>
     </p:spTree>
     <p:extLst>
       <p:ext uri="{BB962C8B-B14F-4D97-AF65-F5344CB8AC3E}">
-        <p14:creationId xmlns:p14="http://schemas.microsoft.com/office/powerpoint/2010/main" val="2164135771"/>
+        <p14:creationId xmlns:p14="http://schemas.microsoft.com/office/powerpoint/2010/main" val="3772906805"/>
       </p:ext>
     </p:extLst>
   </p:cSld>
@@ -6383,6 +6939,21 @@
 </file>
 
 <file path=customXml/item1.xml><?xml version="1.0" encoding="utf-8"?>
+<?mso-contentType ?>
+<FormTemplates xmlns="http://schemas.microsoft.com/sharepoint/v3/contenttype/forms">
+  <Display>DocumentLibraryForm</Display>
+  <Edit>DocumentLibraryForm</Edit>
+  <New>DocumentLibraryForm</New>
+</FormTemplates>
+</file>
+
+<file path=customXml/item2.xml><?xml version="1.0" encoding="utf-8"?>
+<p:properties xmlns:p="http://schemas.microsoft.com/office/2006/metadata/properties" xmlns:xsi="http://www.w3.org/2001/XMLSchema-instance" xmlns:pc="http://schemas.microsoft.com/office/infopath/2007/PartnerControls">
+  <documentManagement/>
+</p:properties>
+</file>
+
+<file path=customXml/item3.xml><?xml version="1.0" encoding="utf-8"?>
 <ct:contentTypeSchema xmlns:ct="http://schemas.microsoft.com/office/2006/metadata/contentType" xmlns:ma="http://schemas.microsoft.com/office/2006/metadata/properties/metaAttributes" ct:_="" ma:_="" ma:contentTypeName="Document" ma:contentTypeID="0x010100CE00E3DD3F93644EA801B0D3E9D0101E" ma:contentTypeVersion="9" ma:contentTypeDescription="Create a new document." ma:contentTypeScope="" ma:versionID="77319cd9a5a9d51af0716fbf9cdfe1a5">
   <xsd:schema xmlns:xsd="http://www.w3.org/2001/XMLSchema" xmlns:xs="http://www.w3.org/2001/XMLSchema" xmlns:p="http://schemas.microsoft.com/office/2006/metadata/properties" xmlns:ns3="f63573de-5006-4638-a3a2-ffa06d305a4b" xmlns:ns4="d720fe94-0d1f-4b0c-9639-e9111546946f" targetNamespace="http://schemas.microsoft.com/office/2006/metadata/properties" ma:root="true" ma:fieldsID="d7ad072c77660d250aee64b081f67a57" ns3:_="" ns4:_="">
     <xsd:import namespace="f63573de-5006-4638-a3a2-ffa06d305a4b"/>
@@ -6579,36 +7150,10 @@
 </ct:contentTypeSchema>
 </file>
 
-<file path=customXml/item2.xml><?xml version="1.0" encoding="utf-8"?>
-<p:properties xmlns:p="http://schemas.microsoft.com/office/2006/metadata/properties" xmlns:xsi="http://www.w3.org/2001/XMLSchema-instance" xmlns:pc="http://schemas.microsoft.com/office/infopath/2007/PartnerControls">
-  <documentManagement/>
-</p:properties>
-</file>
-
-<file path=customXml/item3.xml><?xml version="1.0" encoding="utf-8"?>
-<?mso-contentType ?>
-<FormTemplates xmlns="http://schemas.microsoft.com/sharepoint/v3/contenttype/forms">
-  <Display>DocumentLibraryForm</Display>
-  <Edit>DocumentLibraryForm</Edit>
-  <New>DocumentLibraryForm</New>
-</FormTemplates>
-</file>
-
 <file path=customXml/itemProps1.xml><?xml version="1.0" encoding="utf-8"?>
-<ds:datastoreItem xmlns:ds="http://schemas.openxmlformats.org/officeDocument/2006/customXml" ds:itemID="{FE5F2F34-9AC6-4989-946A-FA9CE5EA1BCA}">
+<ds:datastoreItem xmlns:ds="http://schemas.openxmlformats.org/officeDocument/2006/customXml" ds:itemID="{A00381B9-E460-421A-A3F9-6EA8DCF6B705}">
   <ds:schemaRefs>
-    <ds:schemaRef ds:uri="http://schemas.microsoft.com/office/2006/metadata/contentType"/>
-    <ds:schemaRef ds:uri="http://schemas.microsoft.com/office/2006/metadata/properties/metaAttributes"/>
-    <ds:schemaRef ds:uri="http://www.w3.org/2001/XMLSchema"/>
-    <ds:schemaRef ds:uri="http://schemas.microsoft.com/office/2006/metadata/properties"/>
-    <ds:schemaRef ds:uri="f63573de-5006-4638-a3a2-ffa06d305a4b"/>
-    <ds:schemaRef ds:uri="d720fe94-0d1f-4b0c-9639-e9111546946f"/>
-    <ds:schemaRef ds:uri="http://schemas.microsoft.com/office/2006/documentManagement/types"/>
-    <ds:schemaRef ds:uri="http://schemas.microsoft.com/office/infopath/2007/PartnerControls"/>
-    <ds:schemaRef ds:uri="http://schemas.openxmlformats.org/package/2006/metadata/core-properties"/>
-    <ds:schemaRef ds:uri="http://purl.org/dc/elements/1.1/"/>
-    <ds:schemaRef ds:uri="http://purl.org/dc/terms/"/>
-    <ds:schemaRef ds:uri="http://schemas.microsoft.com/internal/obd"/>
+    <ds:schemaRef ds:uri="http://schemas.microsoft.com/sharepoint/v3/contenttype/forms"/>
   </ds:schemaRefs>
 </ds:datastoreItem>
 </file>
@@ -6631,9 +7176,20 @@
 </file>
 
 <file path=customXml/itemProps3.xml><?xml version="1.0" encoding="utf-8"?>
-<ds:datastoreItem xmlns:ds="http://schemas.openxmlformats.org/officeDocument/2006/customXml" ds:itemID="{A00381B9-E460-421A-A3F9-6EA8DCF6B705}">
+<ds:datastoreItem xmlns:ds="http://schemas.openxmlformats.org/officeDocument/2006/customXml" ds:itemID="{FE5F2F34-9AC6-4989-946A-FA9CE5EA1BCA}">
   <ds:schemaRefs>
-    <ds:schemaRef ds:uri="http://schemas.microsoft.com/sharepoint/v3/contenttype/forms"/>
+    <ds:schemaRef ds:uri="http://schemas.microsoft.com/office/2006/metadata/contentType"/>
+    <ds:schemaRef ds:uri="http://schemas.microsoft.com/office/2006/metadata/properties/metaAttributes"/>
+    <ds:schemaRef ds:uri="http://www.w3.org/2001/XMLSchema"/>
+    <ds:schemaRef ds:uri="http://schemas.microsoft.com/office/2006/metadata/properties"/>
+    <ds:schemaRef ds:uri="f63573de-5006-4638-a3a2-ffa06d305a4b"/>
+    <ds:schemaRef ds:uri="d720fe94-0d1f-4b0c-9639-e9111546946f"/>
+    <ds:schemaRef ds:uri="http://schemas.microsoft.com/office/2006/documentManagement/types"/>
+    <ds:schemaRef ds:uri="http://schemas.microsoft.com/office/infopath/2007/PartnerControls"/>
+    <ds:schemaRef ds:uri="http://schemas.openxmlformats.org/package/2006/metadata/core-properties"/>
+    <ds:schemaRef ds:uri="http://purl.org/dc/elements/1.1/"/>
+    <ds:schemaRef ds:uri="http://purl.org/dc/terms/"/>
+    <ds:schemaRef ds:uri="http://schemas.microsoft.com/internal/obd"/>
   </ds:schemaRefs>
 </ds:datastoreItem>
 </file>
</xml_diff>

<commit_message>
Added a section as a result of questions from the presentation.
</commit_message>
<xml_diff>
--- a/firstPart/Neural Networks - pt 1.pptx
+++ b/firstPart/Neural Networks - pt 1.pptx
@@ -5,7 +5,7 @@
     <p:sldMasterId id="2147483648" r:id="rId4"/>
   </p:sldMasterIdLst>
   <p:notesMasterIdLst>
-    <p:notesMasterId r:id="rId23"/>
+    <p:notesMasterId r:id="rId25"/>
   </p:notesMasterIdLst>
   <p:sldIdLst>
     <p:sldId id="256" r:id="rId5"/>
@@ -25,7 +25,9 @@
     <p:sldId id="351" r:id="rId19"/>
     <p:sldId id="357" r:id="rId20"/>
     <p:sldId id="353" r:id="rId21"/>
-    <p:sldId id="355" r:id="rId22"/>
+    <p:sldId id="358" r:id="rId22"/>
+    <p:sldId id="359" r:id="rId23"/>
+    <p:sldId id="355" r:id="rId24"/>
   </p:sldIdLst>
   <p:sldSz cx="12192000" cy="6858000"/>
   <p:notesSz cx="6858000" cy="9144000"/>
@@ -614,7 +616,7 @@
           <a:p>
             <a:r>
               <a:rPr lang="en-US" dirty="0"/>
-              <a:t>Final</a:t>
+              <a:t>Let’s abandon determinism</a:t>
             </a:r>
           </a:p>
         </p:txBody>
@@ -3929,6 +3931,12 @@
               <a:t>Why the big deal?</a:t>
             </a:r>
           </a:p>
+          <a:p>
+            <a:r>
+              <a:rPr lang="en-US" dirty="0"/>
+              <a:t>A.k.a. why are they so powerful?</a:t>
+            </a:r>
+          </a:p>
         </p:txBody>
       </p:sp>
     </p:spTree>
@@ -4674,7 +4682,7 @@
             </a:pPr>
             <a:r>
               <a:rPr lang="en-US" dirty="0"/>
-              <a:t>Can someone give me an example of a model that might use BMI?--</a:t>
+              <a:t>Can someone give me an example of a model that might use BMI?</a:t>
             </a:r>
           </a:p>
         </p:txBody>
@@ -4783,15 +4791,6 @@
               <a:t>Suppose instead, we added on another hidden layer, the other 4 variables were patient information (e.g. blood sugar, insulin resistance, lipids, etc.), and tried to predict the likelihood of a patient developing type 2 diabetes.</a:t>
             </a:r>
           </a:p>
-          <a:p>
-            <a:pPr marL="0" indent="0">
-              <a:buNone/>
-            </a:pPr>
-            <a:r>
-              <a:rPr lang="en-US" dirty="0"/>
-              <a:t>(we are abandoning determinism)</a:t>
-            </a:r>
-          </a:p>
         </p:txBody>
       </p:sp>
     </p:spTree>
@@ -5083,10 +5082,38 @@
       </p:grpSpPr>
       <p:sp>
         <p:nvSpPr>
+          <p:cNvPr id="2" name="Title 1">
+            <a:extLst>
+              <a:ext uri="{FF2B5EF4-FFF2-40B4-BE49-F238E27FC236}">
+                <a16:creationId xmlns:a16="http://schemas.microsoft.com/office/drawing/2014/main" id="{65402C07-4D99-44F9-9669-30065CEE8769}"/>
+              </a:ext>
+            </a:extLst>
+          </p:cNvPr>
+          <p:cNvSpPr>
+            <a:spLocks noGrp="1"/>
+          </p:cNvSpPr>
+          <p:nvPr>
+            <p:ph type="title"/>
+          </p:nvPr>
+        </p:nvSpPr>
+        <p:spPr/>
+        <p:txBody>
+          <a:bodyPr/>
+          <a:lstStyle/>
+          <a:p>
+            <a:r>
+              <a:rPr lang="en-US" dirty="0"/>
+              <a:t>When would we want to use Neural Networks?</a:t>
+            </a:r>
+          </a:p>
+        </p:txBody>
+      </p:sp>
+      <p:sp>
+        <p:nvSpPr>
           <p:cNvPr id="3" name="Content Placeholder 2">
             <a:extLst>
               <a:ext uri="{FF2B5EF4-FFF2-40B4-BE49-F238E27FC236}">
-                <a16:creationId xmlns:a16="http://schemas.microsoft.com/office/drawing/2014/main" id="{BE6179D1-CD7B-4006-ACA0-241DA0F4EA7F}"/>
+                <a16:creationId xmlns:a16="http://schemas.microsoft.com/office/drawing/2014/main" id="{E05DFE0B-008E-4C2D-B2CD-29E95546E35B}"/>
               </a:ext>
             </a:extLst>
           </p:cNvPr>
@@ -5097,36 +5124,60 @@
             <p:ph idx="1"/>
           </p:nvPr>
         </p:nvSpPr>
-        <p:spPr>
-          <a:xfrm>
-            <a:off x="838200" y="743712"/>
-            <a:ext cx="10515600" cy="5433251"/>
-          </a:xfrm>
-        </p:spPr>
-        <p:txBody>
-          <a:bodyPr>
-            <a:normAutofit/>
-          </a:bodyPr>
-          <a:lstStyle/>
+        <p:spPr/>
+        <p:txBody>
+          <a:bodyPr/>
+          <a:lstStyle/>
+          <a:p>
+            <a:pPr marL="0" indent="0">
+              <a:buNone/>
+            </a:pPr>
+            <a:r>
+              <a:rPr lang="en-US" dirty="0"/>
+              <a:t>Consider the following example (beyond the scope of fully connected NN’s) of a process we wish to automate:</a:t>
+            </a:r>
+          </a:p>
           <a:p>
             <a:pPr marL="0" indent="0" algn="ctr">
               <a:buNone/>
             </a:pPr>
-            <a:endParaRPr lang="en-US" sz="6400" dirty="0"/>
+            <a:r>
+              <a:rPr lang="en-US" dirty="0"/>
+              <a:t>We are looking at millions of 64 pixel by 64 pixel color photos.</a:t>
+            </a:r>
           </a:p>
           <a:p>
             <a:pPr marL="0" indent="0" algn="ctr">
               <a:buNone/>
             </a:pPr>
-            <a:endParaRPr lang="en-US" sz="6400" dirty="0"/>
+            <a:r>
+              <a:rPr lang="en-US" dirty="0"/>
+              <a:t>We wish to determine if there is a cat in a given photo.</a:t>
+            </a:r>
           </a:p>
           <a:p>
             <a:pPr marL="0" indent="0" algn="ctr">
               <a:buNone/>
             </a:pPr>
-            <a:r>
-              <a:rPr lang="en-US" sz="6400" dirty="0"/>
-              <a:t>Questions?</a:t>
+            <a:endParaRPr lang="en-US" dirty="0"/>
+          </a:p>
+          <a:p>
+            <a:pPr marL="0" indent="0">
+              <a:buNone/>
+            </a:pPr>
+            <a:r>
+              <a:rPr lang="en-US" dirty="0"/>
+              <a:t>Each photo will have 12288 (=64*64*3) distinct data points (</a:t>
+            </a:r>
+            <a:r>
+              <a:rPr lang="en-US" dirty="0">
+                <a:hlinkClick r:id="rId2"/>
+              </a:rPr>
+              <a:t>3 RGB channels</a:t>
+            </a:r>
+            <a:r>
+              <a:rPr lang="en-US" dirty="0"/>
+              <a:t>). </a:t>
             </a:r>
           </a:p>
         </p:txBody>
@@ -5134,7 +5185,145 @@
     </p:spTree>
     <p:extLst>
       <p:ext uri="{BB962C8B-B14F-4D97-AF65-F5344CB8AC3E}">
-        <p14:creationId xmlns:p14="http://schemas.microsoft.com/office/powerpoint/2010/main" val="416954271"/>
+        <p14:creationId xmlns:p14="http://schemas.microsoft.com/office/powerpoint/2010/main" val="3088259485"/>
+      </p:ext>
+    </p:extLst>
+  </p:cSld>
+  <p:clrMapOvr>
+    <a:masterClrMapping/>
+  </p:clrMapOvr>
+</p:sld>
+</file>
+
+<file path=ppt/slides/slide19.xml><?xml version="1.0" encoding="utf-8"?>
+<p:sld xmlns:a="http://schemas.openxmlformats.org/drawingml/2006/main" xmlns:r="http://schemas.openxmlformats.org/officeDocument/2006/relationships" xmlns:p="http://schemas.openxmlformats.org/presentationml/2006/main">
+  <p:cSld>
+    <p:spTree>
+      <p:nvGrpSpPr>
+        <p:cNvPr id="1" name=""/>
+        <p:cNvGrpSpPr/>
+        <p:nvPr/>
+      </p:nvGrpSpPr>
+      <p:grpSpPr>
+        <a:xfrm>
+          <a:off x="0" y="0"/>
+          <a:ext cx="0" cy="0"/>
+          <a:chOff x="0" y="0"/>
+          <a:chExt cx="0" cy="0"/>
+        </a:xfrm>
+      </p:grpSpPr>
+      <p:sp>
+        <p:nvSpPr>
+          <p:cNvPr id="2" name="Title 1">
+            <a:extLst>
+              <a:ext uri="{FF2B5EF4-FFF2-40B4-BE49-F238E27FC236}">
+                <a16:creationId xmlns:a16="http://schemas.microsoft.com/office/drawing/2014/main" id="{2ABF72A9-E81B-466A-ABE7-72520A996119}"/>
+              </a:ext>
+            </a:extLst>
+          </p:cNvPr>
+          <p:cNvSpPr>
+            <a:spLocks noGrp="1"/>
+          </p:cNvSpPr>
+          <p:nvPr>
+            <p:ph type="title"/>
+          </p:nvPr>
+        </p:nvSpPr>
+        <p:spPr/>
+        <p:txBody>
+          <a:bodyPr/>
+          <a:lstStyle/>
+          <a:p>
+            <a:r>
+              <a:rPr lang="en-US" dirty="0"/>
+              <a:t>When would we want to use Neural Networks? (continued)</a:t>
+            </a:r>
+          </a:p>
+        </p:txBody>
+      </p:sp>
+      <p:sp>
+        <p:nvSpPr>
+          <p:cNvPr id="3" name="Content Placeholder 2">
+            <a:extLst>
+              <a:ext uri="{FF2B5EF4-FFF2-40B4-BE49-F238E27FC236}">
+                <a16:creationId xmlns:a16="http://schemas.microsoft.com/office/drawing/2014/main" id="{968E749A-45BB-4444-82BD-67B82B1C9BA6}"/>
+              </a:ext>
+            </a:extLst>
+          </p:cNvPr>
+          <p:cNvSpPr>
+            <a:spLocks noGrp="1"/>
+          </p:cNvSpPr>
+          <p:nvPr>
+            <p:ph idx="1"/>
+          </p:nvPr>
+        </p:nvSpPr>
+        <p:spPr/>
+        <p:txBody>
+          <a:bodyPr>
+            <a:normAutofit lnSpcReduction="10000"/>
+          </a:bodyPr>
+          <a:lstStyle/>
+          <a:p>
+            <a:pPr marL="0" indent="0">
+              <a:buNone/>
+            </a:pPr>
+            <a:r>
+              <a:rPr lang="en-US" dirty="0"/>
+              <a:t>This “process” has 3 distinct characteristics that make it well suited to (convolutional) neural networks:</a:t>
+            </a:r>
+          </a:p>
+          <a:p>
+            <a:pPr marL="514350" indent="-514350">
+              <a:buFont typeface="+mj-lt"/>
+              <a:buAutoNum type="arabicPeriod"/>
+            </a:pPr>
+            <a:r>
+              <a:rPr lang="en-US" dirty="0"/>
+              <a:t>There is clear signal in the process (The “cat-ness” of a photo is rarely, if ever, in question),</a:t>
+            </a:r>
+          </a:p>
+          <a:p>
+            <a:pPr marL="514350" indent="-514350">
+              <a:buFont typeface="+mj-lt"/>
+              <a:buAutoNum type="arabicPeriod"/>
+            </a:pPr>
+            <a:r>
+              <a:rPr lang="en-US" dirty="0"/>
+              <a:t>There is a large amount of data (as in, the number of observations), and</a:t>
+            </a:r>
+          </a:p>
+          <a:p>
+            <a:pPr marL="514350" indent="-514350">
+              <a:buFont typeface="+mj-lt"/>
+              <a:buAutoNum type="arabicPeriod"/>
+            </a:pPr>
+            <a:r>
+              <a:rPr lang="en-US" dirty="0"/>
+              <a:t>There is a large amount of data in each observation, with </a:t>
+            </a:r>
+            <a:r>
+              <a:rPr lang="en-US"/>
+              <a:t>no clear means </a:t>
+            </a:r>
+            <a:r>
+              <a:rPr lang="en-US" dirty="0"/>
+              <a:t>of quantifying “cat-ness” from the base data.</a:t>
+            </a:r>
+          </a:p>
+          <a:p>
+            <a:pPr marL="0" indent="0">
+              <a:buNone/>
+            </a:pPr>
+            <a:r>
+              <a:rPr lang="en-US" dirty="0"/>
+              <a:t>Letting Neural Networks do the heavy lifting of identifying the necessary transformations is easier.</a:t>
+            </a:r>
+          </a:p>
+        </p:txBody>
+      </p:sp>
+    </p:spTree>
+    <p:extLst>
+      <p:ext uri="{BB962C8B-B14F-4D97-AF65-F5344CB8AC3E}">
+        <p14:creationId xmlns:p14="http://schemas.microsoft.com/office/powerpoint/2010/main" val="633374328"/>
       </p:ext>
     </p:extLst>
   </p:cSld>
@@ -5207,7 +5396,9 @@
         </p:nvSpPr>
         <p:spPr/>
         <p:txBody>
-          <a:bodyPr/>
+          <a:bodyPr>
+            <a:normAutofit fontScale="92500" lnSpcReduction="20000"/>
+          </a:bodyPr>
           <a:lstStyle/>
           <a:p>
             <a:r>
@@ -5224,8 +5415,14 @@
           </a:p>
           <a:p>
             <a:r>
+              <a:rPr lang="en-US" dirty="0">
+                <a:hlinkClick r:id="rId2"/>
+              </a:rPr>
+              <a:t>Fully-connected Neural Network</a:t>
+            </a:r>
+            <a:r>
               <a:rPr lang="en-US" dirty="0"/>
-              <a:t>Neural Network Anatomy</a:t>
+              <a:t> Anatomy</a:t>
             </a:r>
           </a:p>
           <a:p>
@@ -5253,6 +5450,37 @@
             <a:r>
               <a:rPr lang="en-US" dirty="0"/>
               <a:t>Slight detour</a:t>
+            </a:r>
+          </a:p>
+          <a:p>
+            <a:pPr marL="0" indent="0">
+              <a:buNone/>
+            </a:pPr>
+            <a:endParaRPr lang="en-US" dirty="0"/>
+          </a:p>
+          <a:p>
+            <a:r>
+              <a:rPr lang="en-US" dirty="0"/>
+              <a:t>Limitations</a:t>
+            </a:r>
+          </a:p>
+          <a:p>
+            <a:endParaRPr lang="en-US" dirty="0"/>
+          </a:p>
+          <a:p>
+            <a:r>
+              <a:rPr lang="en-US" dirty="0"/>
+              <a:t>Example of when we want to use (</a:t>
+            </a:r>
+            <a:r>
+              <a:rPr lang="en-US" dirty="0">
+                <a:hlinkClick r:id="rId3"/>
+              </a:rPr>
+              <a:t>convolutional</a:t>
+            </a:r>
+            <a:r>
+              <a:rPr lang="en-US" dirty="0"/>
+              <a:t>) Neural Networks</a:t>
             </a:r>
           </a:p>
           <a:p>
@@ -5270,6 +5498,86 @@
     <p:extLst>
       <p:ext uri="{BB962C8B-B14F-4D97-AF65-F5344CB8AC3E}">
         <p14:creationId xmlns:p14="http://schemas.microsoft.com/office/powerpoint/2010/main" val="4223997192"/>
+      </p:ext>
+    </p:extLst>
+  </p:cSld>
+  <p:clrMapOvr>
+    <a:masterClrMapping/>
+  </p:clrMapOvr>
+</p:sld>
+</file>
+
+<file path=ppt/slides/slide20.xml><?xml version="1.0" encoding="utf-8"?>
+<p:sld xmlns:a="http://schemas.openxmlformats.org/drawingml/2006/main" xmlns:r="http://schemas.openxmlformats.org/officeDocument/2006/relationships" xmlns:p="http://schemas.openxmlformats.org/presentationml/2006/main">
+  <p:cSld>
+    <p:spTree>
+      <p:nvGrpSpPr>
+        <p:cNvPr id="1" name=""/>
+        <p:cNvGrpSpPr/>
+        <p:nvPr/>
+      </p:nvGrpSpPr>
+      <p:grpSpPr>
+        <a:xfrm>
+          <a:off x="0" y="0"/>
+          <a:ext cx="0" cy="0"/>
+          <a:chOff x="0" y="0"/>
+          <a:chExt cx="0" cy="0"/>
+        </a:xfrm>
+      </p:grpSpPr>
+      <p:sp>
+        <p:nvSpPr>
+          <p:cNvPr id="3" name="Content Placeholder 2">
+            <a:extLst>
+              <a:ext uri="{FF2B5EF4-FFF2-40B4-BE49-F238E27FC236}">
+                <a16:creationId xmlns:a16="http://schemas.microsoft.com/office/drawing/2014/main" id="{BE6179D1-CD7B-4006-ACA0-241DA0F4EA7F}"/>
+              </a:ext>
+            </a:extLst>
+          </p:cNvPr>
+          <p:cNvSpPr>
+            <a:spLocks noGrp="1"/>
+          </p:cNvSpPr>
+          <p:nvPr>
+            <p:ph idx="1"/>
+          </p:nvPr>
+        </p:nvSpPr>
+        <p:spPr>
+          <a:xfrm>
+            <a:off x="838200" y="743712"/>
+            <a:ext cx="10515600" cy="5433251"/>
+          </a:xfrm>
+        </p:spPr>
+        <p:txBody>
+          <a:bodyPr>
+            <a:normAutofit/>
+          </a:bodyPr>
+          <a:lstStyle/>
+          <a:p>
+            <a:pPr marL="0" indent="0" algn="ctr">
+              <a:buNone/>
+            </a:pPr>
+            <a:endParaRPr lang="en-US" sz="6400" dirty="0"/>
+          </a:p>
+          <a:p>
+            <a:pPr marL="0" indent="0" algn="ctr">
+              <a:buNone/>
+            </a:pPr>
+            <a:endParaRPr lang="en-US" sz="6400" dirty="0"/>
+          </a:p>
+          <a:p>
+            <a:pPr marL="0" indent="0" algn="ctr">
+              <a:buNone/>
+            </a:pPr>
+            <a:r>
+              <a:rPr lang="en-US" sz="6400" dirty="0"/>
+              <a:t>Questions?</a:t>
+            </a:r>
+          </a:p>
+        </p:txBody>
+      </p:sp>
+    </p:spTree>
+    <p:extLst>
+      <p:ext uri="{BB962C8B-B14F-4D97-AF65-F5344CB8AC3E}">
+        <p14:creationId xmlns:p14="http://schemas.microsoft.com/office/powerpoint/2010/main" val="416954271"/>
       </p:ext>
     </p:extLst>
   </p:cSld>
@@ -5444,13 +5752,8 @@
           <a:p>
             <a:r>
               <a:rPr lang="en-US" dirty="0"/>
-              <a:t>What is Body Mass Index (BMI)? </a:t>
-            </a:r>
-            <a:r>
-              <a:rPr lang="en-US"/>
-              <a:t>(answers)</a:t>
-            </a:r>
-            <a:endParaRPr lang="en-US" dirty="0"/>
+              <a:t>What is Body Mass Index (BMI)? (answers)</a:t>
+            </a:r>
           </a:p>
         </p:txBody>
       </p:sp>

</xml_diff>